<commit_message>
added states for full model
</commit_message>
<xml_diff>
--- a/figures/full_model_diagram.pptx
+++ b/figures/full_model_diagram.pptx
@@ -3088,7 +3088,7 @@
         <p:spPr>
           <a:xfrm>
             <a:off x="4736296" y="3663359"/>
-            <a:ext cx="1188720" cy="1188720"/>
+            <a:ext cx="1280160" cy="1280160"/>
           </a:xfrm>
           <a:prstGeom prst="ellipse">
             <a:avLst/>
@@ -3147,7 +3147,7 @@
         </p:nvSpPr>
         <p:spPr>
           <a:xfrm>
-            <a:off x="4669704" y="3992301"/>
+            <a:off x="4725122" y="4047719"/>
             <a:ext cx="1321904" cy="1753942"/>
           </a:xfrm>
           <a:prstGeom prst="rect">
@@ -3197,7 +3197,7 @@
         <p:spPr>
           <a:xfrm>
             <a:off x="2644869" y="3663632"/>
-            <a:ext cx="1188720" cy="1188720"/>
+            <a:ext cx="1280160" cy="1280160"/>
           </a:xfrm>
           <a:prstGeom prst="ellipse">
             <a:avLst/>
@@ -3256,7 +3256,7 @@
         </p:nvSpPr>
         <p:spPr>
           <a:xfrm>
-            <a:off x="2578277" y="3992574"/>
+            <a:off x="2605986" y="4020283"/>
             <a:ext cx="1321904" cy="1753942"/>
           </a:xfrm>
           <a:prstGeom prst="rect">
@@ -4199,7 +4199,7 @@
         <p:spPr>
           <a:xfrm>
             <a:off x="7203471" y="3662188"/>
-            <a:ext cx="1188720" cy="1188720"/>
+            <a:ext cx="1280160" cy="1280160"/>
           </a:xfrm>
           <a:prstGeom prst="ellipse">
             <a:avLst/>
@@ -4298,8 +4298,8 @@
         </p:nvSpPr>
         <p:spPr>
           <a:xfrm>
-            <a:off x="14743749" y="7921202"/>
-            <a:ext cx="1188720" cy="1188720"/>
+            <a:off x="13634370" y="6699841"/>
+            <a:ext cx="1280160" cy="1280160"/>
           </a:xfrm>
           <a:prstGeom prst="ellipse">
             <a:avLst/>
@@ -4358,7 +4358,7 @@
         </p:nvSpPr>
         <p:spPr>
           <a:xfrm>
-            <a:off x="14677157" y="8250144"/>
+            <a:off x="13623196" y="7056492"/>
             <a:ext cx="1321904" cy="1753942"/>
           </a:xfrm>
           <a:prstGeom prst="rect">
@@ -4489,9 +4489,9 @@
           <p:nvPr/>
         </p:nvCxnSpPr>
         <p:spPr>
-          <a:xfrm>
-            <a:off x="7797831" y="4850908"/>
-            <a:ext cx="15846" cy="605926"/>
+          <a:xfrm flipH="1">
+            <a:off x="7813677" y="4942348"/>
+            <a:ext cx="29874" cy="514486"/>
           </a:xfrm>
           <a:prstGeom prst="straightConnector1">
             <a:avLst/>
@@ -4530,15 +4530,14 @@
           </p:cNvPr>
           <p:cNvCxnSpPr>
             <a:cxnSpLocks/>
-            <a:stCxn id="63" idx="3"/>
-            <a:endCxn id="39" idx="7"/>
+            <a:endCxn id="39" idx="0"/>
           </p:cNvCxnSpPr>
           <p:nvPr/>
         </p:nvCxnSpPr>
         <p:spPr>
           <a:xfrm flipH="1">
-            <a:off x="14084073" y="8935838"/>
-            <a:ext cx="833760" cy="367702"/>
+            <a:off x="13437495" y="7980001"/>
+            <a:ext cx="840746" cy="1055717"/>
           </a:xfrm>
           <a:prstGeom prst="straightConnector1">
             <a:avLst/>
@@ -4566,119 +4565,6 @@
           </a:fontRef>
         </p:style>
       </p:cxnSp>
-      <p:grpSp>
-        <p:nvGrpSpPr>
-          <p:cNvPr id="111" name="Group 110">
-            <a:extLst>
-              <a:ext uri="{FF2B5EF4-FFF2-40B4-BE49-F238E27FC236}">
-                <a16:creationId xmlns:a16="http://schemas.microsoft.com/office/drawing/2014/main" id="{76C2BC32-88AD-D844-93B4-DD0E145D752C}"/>
-              </a:ext>
-            </a:extLst>
-          </p:cNvPr>
-          <p:cNvGrpSpPr/>
-          <p:nvPr/>
-        </p:nvGrpSpPr>
-        <p:grpSpPr>
-          <a:xfrm>
-            <a:off x="76243" y="303051"/>
-            <a:ext cx="1321904" cy="890222"/>
-            <a:chOff x="2632449" y="5669280"/>
-            <a:chExt cx="1321904" cy="890222"/>
-          </a:xfrm>
-        </p:grpSpPr>
-        <p:sp>
-          <p:nvSpPr>
-            <p:cNvPr id="112" name="Oval 111">
-              <a:extLst>
-                <a:ext uri="{FF2B5EF4-FFF2-40B4-BE49-F238E27FC236}">
-                  <a16:creationId xmlns:a16="http://schemas.microsoft.com/office/drawing/2014/main" id="{D8A87FF8-E5A8-7B4F-9B4C-E50C54A66409}"/>
-                </a:ext>
-              </a:extLst>
-            </p:cNvPr>
-            <p:cNvSpPr>
-              <a:spLocks noChangeAspect="1"/>
-            </p:cNvSpPr>
-            <p:nvPr/>
-          </p:nvSpPr>
-          <p:spPr>
-            <a:xfrm>
-              <a:off x="2867299" y="5669280"/>
-              <a:ext cx="829210" cy="829210"/>
-            </a:xfrm>
-            <a:prstGeom prst="ellipse">
-              <a:avLst/>
-            </a:prstGeom>
-            <a:noFill/>
-            <a:ln w="25400">
-              <a:solidFill>
-                <a:srgbClr val="C00000"/>
-              </a:solidFill>
-            </a:ln>
-          </p:spPr>
-          <p:style>
-            <a:lnRef idx="2">
-              <a:schemeClr val="accent1">
-                <a:shade val="50000"/>
-              </a:schemeClr>
-            </a:lnRef>
-            <a:fillRef idx="1">
-              <a:schemeClr val="accent1"/>
-            </a:fillRef>
-            <a:effectRef idx="0">
-              <a:schemeClr val="accent1"/>
-            </a:effectRef>
-            <a:fontRef idx="minor">
-              <a:schemeClr val="lt1"/>
-            </a:fontRef>
-          </p:style>
-          <p:txBody>
-            <a:bodyPr rtlCol="0" anchor="ctr"/>
-            <a:lstStyle/>
-            <a:p>
-              <a:pPr algn="ctr"/>
-              <a:endParaRPr lang="en-US"/>
-            </a:p>
-          </p:txBody>
-        </p:sp>
-        <p:sp>
-          <p:nvSpPr>
-            <p:cNvPr id="113" name="TextBox 112">
-              <a:extLst>
-                <a:ext uri="{FF2B5EF4-FFF2-40B4-BE49-F238E27FC236}">
-                  <a16:creationId xmlns:a16="http://schemas.microsoft.com/office/drawing/2014/main" id="{67DB2EB2-7868-DE4C-8F5E-4DF9C1CCE4BD}"/>
-                </a:ext>
-              </a:extLst>
-            </p:cNvPr>
-            <p:cNvSpPr txBox="1"/>
-            <p:nvPr/>
-          </p:nvSpPr>
-          <p:spPr>
-            <a:xfrm>
-              <a:off x="2632449" y="5913299"/>
-              <a:ext cx="1321904" cy="646203"/>
-            </a:xfrm>
-            <a:prstGeom prst="rect">
-              <a:avLst/>
-            </a:prstGeom>
-            <a:noFill/>
-          </p:spPr>
-          <p:txBody>
-            <a:bodyPr wrap="square" rtlCol="0">
-              <a:spAutoFit/>
-            </a:bodyPr>
-            <a:lstStyle/>
-            <a:p>
-              <a:pPr algn="ctr"/>
-              <a:r>
-                <a:rPr lang="en-US" dirty="0">
-                  <a:latin typeface="Helvetica" pitchFamily="2" charset="0"/>
-                </a:rPr>
-                <a:t>Loss</a:t>
-              </a:r>
-            </a:p>
-          </p:txBody>
-        </p:sp>
-      </p:grpSp>
       <p:sp>
         <p:nvSpPr>
           <p:cNvPr id="72" name="TextBox 71">
@@ -4807,7 +4693,7 @@
         </p:nvSpPr>
         <p:spPr>
           <a:xfrm>
-            <a:off x="10199558" y="3611912"/>
+            <a:off x="10199558" y="3662188"/>
             <a:ext cx="721743" cy="523220"/>
           </a:xfrm>
           <a:prstGeom prst="rect">
@@ -4883,7 +4769,7 @@
         </p:nvSpPr>
         <p:spPr>
           <a:xfrm>
-            <a:off x="14359397" y="7902505"/>
+            <a:off x="13276522" y="6681144"/>
             <a:ext cx="1989181" cy="523220"/>
           </a:xfrm>
           <a:prstGeom prst="rect">
@@ -4902,7 +4788,7 @@
               <a:rPr lang="en-US" sz="2800" dirty="0">
                 <a:latin typeface="Helvetica" pitchFamily="2" charset="0"/>
               </a:rPr>
-              <a:t>8</a:t>
+              <a:t>21</a:t>
             </a:r>
           </a:p>
         </p:txBody>
@@ -4921,7 +4807,7 @@
         </p:nvSpPr>
         <p:spPr>
           <a:xfrm>
-            <a:off x="4349939" y="3611912"/>
+            <a:off x="4401644" y="3668692"/>
             <a:ext cx="1989181" cy="523220"/>
           </a:xfrm>
           <a:prstGeom prst="rect">
@@ -4940,7 +4826,7 @@
               <a:rPr lang="en-US" sz="2800" dirty="0">
                 <a:latin typeface="Helvetica" pitchFamily="2" charset="0"/>
               </a:rPr>
-              <a:t>7</a:t>
+              <a:t>11</a:t>
             </a:r>
           </a:p>
         </p:txBody>
@@ -4978,7 +4864,7 @@
               <a:rPr lang="en-US" sz="2800" dirty="0">
                 <a:latin typeface="Helvetica" pitchFamily="2" charset="0"/>
               </a:rPr>
-              <a:t>6</a:t>
+              <a:t>10</a:t>
             </a:r>
           </a:p>
         </p:txBody>
@@ -4999,7 +4885,7 @@
         </p:nvSpPr>
         <p:spPr>
           <a:xfrm>
-            <a:off x="12548069" y="1620166"/>
+            <a:off x="12575778" y="2174346"/>
             <a:ext cx="1828800" cy="1828800"/>
           </a:xfrm>
           <a:prstGeom prst="ellipse">
@@ -5057,7 +4943,7 @@
         </p:nvSpPr>
         <p:spPr>
           <a:xfrm>
-            <a:off x="12810561" y="2211400"/>
+            <a:off x="12838270" y="2765580"/>
             <a:ext cx="1321904" cy="646331"/>
           </a:xfrm>
           <a:prstGeom prst="rect">
@@ -5095,7 +4981,7 @@
         </p:nvSpPr>
         <p:spPr>
           <a:xfrm>
-            <a:off x="12467879" y="1677922"/>
+            <a:off x="12495588" y="2232102"/>
             <a:ext cx="1989181" cy="523220"/>
           </a:xfrm>
           <a:prstGeom prst="rect">
@@ -5135,7 +5021,7 @@
         </p:nvSpPr>
         <p:spPr>
           <a:xfrm>
-            <a:off x="16056594" y="1641805"/>
+            <a:off x="16790216" y="2140688"/>
             <a:ext cx="1828800" cy="1828800"/>
           </a:xfrm>
           <a:prstGeom prst="ellipse">
@@ -5193,7 +5079,7 @@
         </p:nvSpPr>
         <p:spPr>
           <a:xfrm>
-            <a:off x="16319086" y="2233039"/>
+            <a:off x="17052708" y="2731922"/>
             <a:ext cx="1321904" cy="646331"/>
           </a:xfrm>
           <a:prstGeom prst="rect">
@@ -5231,7 +5117,7 @@
         </p:nvSpPr>
         <p:spPr>
           <a:xfrm>
-            <a:off x="15976404" y="1699561"/>
+            <a:off x="16710026" y="2198444"/>
             <a:ext cx="1989181" cy="523220"/>
           </a:xfrm>
           <a:prstGeom prst="rect">
@@ -5271,7 +5157,7 @@
         </p:nvSpPr>
         <p:spPr>
           <a:xfrm>
-            <a:off x="21080832" y="1620166"/>
+            <a:off x="21108541" y="2174346"/>
             <a:ext cx="1828800" cy="1828800"/>
           </a:xfrm>
           <a:prstGeom prst="ellipse">
@@ -5329,7 +5215,7 @@
         </p:nvSpPr>
         <p:spPr>
           <a:xfrm>
-            <a:off x="21343324" y="2211400"/>
+            <a:off x="21371033" y="2765580"/>
             <a:ext cx="1321904" cy="646331"/>
           </a:xfrm>
           <a:prstGeom prst="rect">
@@ -5367,7 +5253,7 @@
         </p:nvSpPr>
         <p:spPr>
           <a:xfrm>
-            <a:off x="21000642" y="1677922"/>
+            <a:off x="21028351" y="2232102"/>
             <a:ext cx="1989181" cy="523220"/>
           </a:xfrm>
           <a:prstGeom prst="rect">
@@ -5407,7 +5293,7 @@
         </p:nvSpPr>
         <p:spPr>
           <a:xfrm>
-            <a:off x="18151718" y="9343950"/>
+            <a:off x="18838519" y="9065283"/>
             <a:ext cx="1828800" cy="1828800"/>
           </a:xfrm>
           <a:prstGeom prst="ellipse">
@@ -5465,7 +5351,7 @@
         </p:nvSpPr>
         <p:spPr>
           <a:xfrm>
-            <a:off x="18414210" y="9935184"/>
+            <a:off x="19101011" y="9656517"/>
             <a:ext cx="1321904" cy="646331"/>
           </a:xfrm>
           <a:prstGeom prst="rect">
@@ -5503,7 +5389,7 @@
         </p:nvSpPr>
         <p:spPr>
           <a:xfrm>
-            <a:off x="18087633" y="9426898"/>
+            <a:off x="18774434" y="9148231"/>
             <a:ext cx="1989181" cy="523220"/>
           </a:xfrm>
           <a:prstGeom prst="rect">
@@ -5544,7 +5430,7 @@
         <p:spPr>
           <a:xfrm>
             <a:off x="1677011" y="7859274"/>
-            <a:ext cx="1188720" cy="1188720"/>
+            <a:ext cx="1280160" cy="1280160"/>
           </a:xfrm>
           <a:prstGeom prst="ellipse">
             <a:avLst/>
@@ -5706,7 +5592,7 @@
               <a:rPr lang="en-US" sz="2800" dirty="0">
                 <a:latin typeface="Helvetica" pitchFamily="2" charset="0"/>
               </a:rPr>
-              <a:t>6</a:t>
+              <a:t>12</a:t>
             </a:r>
           </a:p>
         </p:txBody>
@@ -5728,7 +5614,7 @@
         <p:spPr>
           <a:xfrm>
             <a:off x="3630159" y="8845496"/>
-            <a:ext cx="1188720" cy="1188720"/>
+            <a:ext cx="1280160" cy="1280160"/>
           </a:xfrm>
           <a:prstGeom prst="ellipse">
             <a:avLst/>
@@ -5787,7 +5673,7 @@
         </p:nvSpPr>
         <p:spPr>
           <a:xfrm>
-            <a:off x="3563567" y="9174438"/>
+            <a:off x="3646982" y="9174438"/>
             <a:ext cx="1321904" cy="646331"/>
           </a:xfrm>
           <a:prstGeom prst="rect">
@@ -5896,7 +5782,7 @@
               <a:rPr lang="en-US" sz="2800" dirty="0">
                 <a:latin typeface="Helvetica" pitchFamily="2" charset="0"/>
               </a:rPr>
-              <a:t>6</a:t>
+              <a:t>13</a:t>
             </a:r>
           </a:p>
         </p:txBody>
@@ -5918,7 +5804,7 @@
         <p:spPr>
           <a:xfrm>
             <a:off x="5378124" y="8641722"/>
-            <a:ext cx="1188720" cy="1188720"/>
+            <a:ext cx="1280160" cy="1280160"/>
           </a:xfrm>
           <a:prstGeom prst="ellipse">
             <a:avLst/>
@@ -6020,7 +5906,7 @@
         <p:spPr>
           <a:xfrm flipH="1" flipV="1">
             <a:off x="4960698" y="7017328"/>
-            <a:ext cx="1011786" cy="1624394"/>
+            <a:ext cx="1057506" cy="1624394"/>
           </a:xfrm>
           <a:prstGeom prst="straightConnector1">
             <a:avLst/>
@@ -6206,15 +6092,15 @@
           </p:cNvPr>
           <p:cNvCxnSpPr>
             <a:cxnSpLocks/>
-            <a:stCxn id="44" idx="7"/>
+            <a:stCxn id="44" idx="6"/>
             <a:endCxn id="107" idx="3"/>
           </p:cNvCxnSpPr>
           <p:nvPr/>
         </p:nvCxnSpPr>
         <p:spPr>
           <a:xfrm flipV="1">
-            <a:off x="11207008" y="3181144"/>
-            <a:ext cx="1608883" cy="612005"/>
+            <a:off x="11474830" y="3735324"/>
+            <a:ext cx="1368770" cy="704403"/>
           </a:xfrm>
           <a:prstGeom prst="straightConnector1">
             <a:avLst/>
@@ -6258,8 +6144,8 @@
         </p:nvSpPr>
         <p:spPr>
           <a:xfrm>
-            <a:off x="9838099" y="2485949"/>
-            <a:ext cx="1188720" cy="1188720"/>
+            <a:off x="10640357" y="674644"/>
+            <a:ext cx="1280160" cy="1280160"/>
           </a:xfrm>
           <a:prstGeom prst="ellipse">
             <a:avLst/>
@@ -6318,8 +6204,8 @@
         </p:nvSpPr>
         <p:spPr>
           <a:xfrm>
-            <a:off x="9771507" y="2814891"/>
-            <a:ext cx="1321904" cy="646331"/>
+            <a:off x="10573765" y="1003585"/>
+            <a:ext cx="1453308" cy="623308"/>
           </a:xfrm>
           <a:prstGeom prst="rect">
             <a:avLst/>
@@ -6328,7 +6214,7 @@
         </p:spPr>
         <p:txBody>
           <a:bodyPr wrap="square" rtlCol="0">
-            <a:spAutoFit/>
+            <a:noAutofit/>
           </a:bodyPr>
           <a:lstStyle/>
           <a:p>
@@ -6358,8 +6244,8 @@
         </p:nvSpPr>
         <p:spPr>
           <a:xfrm>
-            <a:off x="11230426" y="397788"/>
-            <a:ext cx="1188720" cy="1188720"/>
+            <a:off x="17110256" y="491835"/>
+            <a:ext cx="1280160" cy="1280160"/>
           </a:xfrm>
           <a:prstGeom prst="ellipse">
             <a:avLst/>
@@ -6418,7 +6304,7 @@
         </p:nvSpPr>
         <p:spPr>
           <a:xfrm>
-            <a:off x="11163834" y="726730"/>
+            <a:off x="17043664" y="820777"/>
             <a:ext cx="1321904" cy="646331"/>
           </a:xfrm>
           <a:prstGeom prst="rect">
@@ -6434,14 +6320,1972 @@
           <a:p>
             <a:pPr algn="ctr"/>
             <a:r>
-              <a:rPr lang="en-US">
+              <a:rPr lang="en-US" dirty="0">
                 <a:latin typeface="Helvetica" pitchFamily="2" charset="0"/>
               </a:rPr>
               <a:t>Entiat River</a:t>
             </a:r>
-            <a:endParaRPr lang="en-US" dirty="0">
-              <a:latin typeface="Helvetica" pitchFamily="2" charset="0"/>
+          </a:p>
+        </p:txBody>
+      </p:sp>
+      <p:sp>
+        <p:nvSpPr>
+          <p:cNvPr id="165" name="Oval 164">
+            <a:extLst>
+              <a:ext uri="{FF2B5EF4-FFF2-40B4-BE49-F238E27FC236}">
+                <a16:creationId xmlns:a16="http://schemas.microsoft.com/office/drawing/2014/main" id="{C139C1AB-77B0-E640-8739-AA9598D483B4}"/>
+              </a:ext>
+            </a:extLst>
+          </p:cNvPr>
+          <p:cNvSpPr>
+            <a:spLocks noChangeAspect="1"/>
+          </p:cNvSpPr>
+          <p:nvPr/>
+        </p:nvSpPr>
+        <p:spPr>
+          <a:xfrm>
+            <a:off x="19144185" y="12304259"/>
+            <a:ext cx="1280160" cy="1280160"/>
+          </a:xfrm>
+          <a:prstGeom prst="ellipse">
+            <a:avLst/>
+          </a:prstGeom>
+          <a:noFill/>
+          <a:ln w="25400">
+            <a:solidFill>
+              <a:schemeClr val="accent6">
+                <a:lumMod val="75000"/>
+              </a:schemeClr>
+            </a:solidFill>
+          </a:ln>
+        </p:spPr>
+        <p:style>
+          <a:lnRef idx="2">
+            <a:schemeClr val="accent1">
+              <a:shade val="50000"/>
+            </a:schemeClr>
+          </a:lnRef>
+          <a:fillRef idx="1">
+            <a:schemeClr val="accent1"/>
+          </a:fillRef>
+          <a:effectRef idx="0">
+            <a:schemeClr val="accent1"/>
+          </a:effectRef>
+          <a:fontRef idx="minor">
+            <a:schemeClr val="lt1"/>
+          </a:fontRef>
+        </p:style>
+        <p:txBody>
+          <a:bodyPr rtlCol="0" anchor="ctr"/>
+          <a:lstStyle/>
+          <a:p>
+            <a:pPr algn="ctr"/>
+            <a:endParaRPr lang="en-US">
+              <a:solidFill>
+                <a:schemeClr val="accent6">
+                  <a:lumMod val="75000"/>
+                </a:schemeClr>
+              </a:solidFill>
             </a:endParaRPr>
+          </a:p>
+        </p:txBody>
+      </p:sp>
+      <p:sp>
+        <p:nvSpPr>
+          <p:cNvPr id="166" name="TextBox 165">
+            <a:extLst>
+              <a:ext uri="{FF2B5EF4-FFF2-40B4-BE49-F238E27FC236}">
+                <a16:creationId xmlns:a16="http://schemas.microsoft.com/office/drawing/2014/main" id="{DA32E723-4595-FD4A-B669-244AE625F918}"/>
+              </a:ext>
+            </a:extLst>
+          </p:cNvPr>
+          <p:cNvSpPr txBox="1"/>
+          <p:nvPr/>
+        </p:nvSpPr>
+        <p:spPr>
+          <a:xfrm>
+            <a:off x="19077593" y="12633201"/>
+            <a:ext cx="1321904" cy="923330"/>
+          </a:xfrm>
+          <a:prstGeom prst="rect">
+            <a:avLst/>
+          </a:prstGeom>
+          <a:noFill/>
+        </p:spPr>
+        <p:txBody>
+          <a:bodyPr wrap="square" rtlCol="0">
+            <a:spAutoFit/>
+          </a:bodyPr>
+          <a:lstStyle/>
+          <a:p>
+            <a:pPr algn="ctr"/>
+            <a:r>
+              <a:rPr lang="en-US" dirty="0">
+                <a:latin typeface="Helvetica" pitchFamily="2" charset="0"/>
+              </a:rPr>
+              <a:t>Grande Ronde River</a:t>
+            </a:r>
+          </a:p>
+        </p:txBody>
+      </p:sp>
+      <p:cxnSp>
+        <p:nvCxnSpPr>
+          <p:cNvPr id="167" name="Straight Arrow Connector 166">
+            <a:extLst>
+              <a:ext uri="{FF2B5EF4-FFF2-40B4-BE49-F238E27FC236}">
+                <a16:creationId xmlns:a16="http://schemas.microsoft.com/office/drawing/2014/main" id="{EBC3FBDF-E7A7-2943-B067-2F2C2B89EA23}"/>
+              </a:ext>
+            </a:extLst>
+          </p:cNvPr>
+          <p:cNvCxnSpPr>
+            <a:cxnSpLocks/>
+            <a:stCxn id="168" idx="0"/>
+            <a:endCxn id="141" idx="4"/>
+          </p:cNvCxnSpPr>
+          <p:nvPr/>
+        </p:nvCxnSpPr>
+        <p:spPr>
+          <a:xfrm flipH="1" flipV="1">
+            <a:off x="19752919" y="10894083"/>
+            <a:ext cx="1505" cy="1391479"/>
+          </a:xfrm>
+          <a:prstGeom prst="straightConnector1">
+            <a:avLst/>
+          </a:prstGeom>
+          <a:ln>
+            <a:solidFill>
+              <a:schemeClr val="tx1"/>
+            </a:solidFill>
+            <a:headEnd type="triangle"/>
+            <a:tailEnd type="triangle"/>
+          </a:ln>
+        </p:spPr>
+        <p:style>
+          <a:lnRef idx="1">
+            <a:schemeClr val="accent1"/>
+          </a:lnRef>
+          <a:fillRef idx="0">
+            <a:schemeClr val="accent1"/>
+          </a:fillRef>
+          <a:effectRef idx="0">
+            <a:schemeClr val="accent1"/>
+          </a:effectRef>
+          <a:fontRef idx="minor">
+            <a:schemeClr val="tx1"/>
+          </a:fontRef>
+        </p:style>
+      </p:cxnSp>
+      <p:sp>
+        <p:nvSpPr>
+          <p:cNvPr id="168" name="TextBox 167">
+            <a:extLst>
+              <a:ext uri="{FF2B5EF4-FFF2-40B4-BE49-F238E27FC236}">
+                <a16:creationId xmlns:a16="http://schemas.microsoft.com/office/drawing/2014/main" id="{3A21E539-0E09-3943-985C-311DBE662221}"/>
+              </a:ext>
+            </a:extLst>
+          </p:cNvPr>
+          <p:cNvSpPr txBox="1"/>
+          <p:nvPr/>
+        </p:nvSpPr>
+        <p:spPr>
+          <a:xfrm>
+            <a:off x="18759833" y="12285562"/>
+            <a:ext cx="1989181" cy="523220"/>
+          </a:xfrm>
+          <a:prstGeom prst="rect">
+            <a:avLst/>
+          </a:prstGeom>
+          <a:noFill/>
+        </p:spPr>
+        <p:txBody>
+          <a:bodyPr wrap="square" rtlCol="0">
+            <a:spAutoFit/>
+          </a:bodyPr>
+          <a:lstStyle/>
+          <a:p>
+            <a:pPr algn="ctr"/>
+            <a:r>
+              <a:rPr lang="en-US" sz="2800" dirty="0">
+                <a:latin typeface="Helvetica" pitchFamily="2" charset="0"/>
+              </a:rPr>
+              <a:t>25</a:t>
+            </a:r>
+          </a:p>
+        </p:txBody>
+      </p:sp>
+      <p:sp>
+        <p:nvSpPr>
+          <p:cNvPr id="169" name="Oval 168">
+            <a:extLst>
+              <a:ext uri="{FF2B5EF4-FFF2-40B4-BE49-F238E27FC236}">
+                <a16:creationId xmlns:a16="http://schemas.microsoft.com/office/drawing/2014/main" id="{6B2AF1E5-0216-8A46-922E-1EA022F0B8FD}"/>
+              </a:ext>
+            </a:extLst>
+          </p:cNvPr>
+          <p:cNvSpPr>
+            <a:spLocks noChangeAspect="1"/>
+          </p:cNvSpPr>
+          <p:nvPr/>
+        </p:nvSpPr>
+        <p:spPr>
+          <a:xfrm>
+            <a:off x="22448643" y="11677763"/>
+            <a:ext cx="1280160" cy="1280160"/>
+          </a:xfrm>
+          <a:prstGeom prst="ellipse">
+            <a:avLst/>
+          </a:prstGeom>
+          <a:noFill/>
+          <a:ln w="25400">
+            <a:solidFill>
+              <a:schemeClr val="accent6">
+                <a:lumMod val="75000"/>
+              </a:schemeClr>
+            </a:solidFill>
+          </a:ln>
+        </p:spPr>
+        <p:style>
+          <a:lnRef idx="2">
+            <a:schemeClr val="accent1">
+              <a:shade val="50000"/>
+            </a:schemeClr>
+          </a:lnRef>
+          <a:fillRef idx="1">
+            <a:schemeClr val="accent1"/>
+          </a:fillRef>
+          <a:effectRef idx="0">
+            <a:schemeClr val="accent1"/>
+          </a:effectRef>
+          <a:fontRef idx="minor">
+            <a:schemeClr val="lt1"/>
+          </a:fontRef>
+        </p:style>
+        <p:txBody>
+          <a:bodyPr rtlCol="0" anchor="ctr"/>
+          <a:lstStyle/>
+          <a:p>
+            <a:pPr algn="ctr"/>
+            <a:endParaRPr lang="en-US">
+              <a:solidFill>
+                <a:schemeClr val="accent6">
+                  <a:lumMod val="75000"/>
+                </a:schemeClr>
+              </a:solidFill>
+            </a:endParaRPr>
+          </a:p>
+        </p:txBody>
+      </p:sp>
+      <p:sp>
+        <p:nvSpPr>
+          <p:cNvPr id="170" name="TextBox 169">
+            <a:extLst>
+              <a:ext uri="{FF2B5EF4-FFF2-40B4-BE49-F238E27FC236}">
+                <a16:creationId xmlns:a16="http://schemas.microsoft.com/office/drawing/2014/main" id="{505D2311-2A4E-6544-A680-E78B23413ECA}"/>
+              </a:ext>
+            </a:extLst>
+          </p:cNvPr>
+          <p:cNvSpPr txBox="1"/>
+          <p:nvPr/>
+        </p:nvSpPr>
+        <p:spPr>
+          <a:xfrm>
+            <a:off x="22382051" y="12006705"/>
+            <a:ext cx="1321904" cy="646331"/>
+          </a:xfrm>
+          <a:prstGeom prst="rect">
+            <a:avLst/>
+          </a:prstGeom>
+          <a:noFill/>
+        </p:spPr>
+        <p:txBody>
+          <a:bodyPr wrap="square" rtlCol="0">
+            <a:spAutoFit/>
+          </a:bodyPr>
+          <a:lstStyle/>
+          <a:p>
+            <a:pPr algn="ctr"/>
+            <a:r>
+              <a:rPr lang="en-US" dirty="0">
+                <a:latin typeface="Helvetica" pitchFamily="2" charset="0"/>
+              </a:rPr>
+              <a:t>Imnaha River</a:t>
+            </a:r>
+          </a:p>
+        </p:txBody>
+      </p:sp>
+      <p:cxnSp>
+        <p:nvCxnSpPr>
+          <p:cNvPr id="171" name="Straight Arrow Connector 170">
+            <a:extLst>
+              <a:ext uri="{FF2B5EF4-FFF2-40B4-BE49-F238E27FC236}">
+                <a16:creationId xmlns:a16="http://schemas.microsoft.com/office/drawing/2014/main" id="{D4694408-005C-0B4E-A08E-03C7E7ADE432}"/>
+              </a:ext>
+            </a:extLst>
+          </p:cNvPr>
+          <p:cNvCxnSpPr>
+            <a:cxnSpLocks/>
+            <a:stCxn id="172" idx="0"/>
+            <a:endCxn id="141" idx="5"/>
+          </p:cNvCxnSpPr>
+          <p:nvPr/>
+        </p:nvCxnSpPr>
+        <p:spPr>
+          <a:xfrm flipH="1" flipV="1">
+            <a:off x="20399497" y="10626261"/>
+            <a:ext cx="2659385" cy="1032805"/>
+          </a:xfrm>
+          <a:prstGeom prst="straightConnector1">
+            <a:avLst/>
+          </a:prstGeom>
+          <a:ln>
+            <a:solidFill>
+              <a:schemeClr val="tx1"/>
+            </a:solidFill>
+            <a:headEnd type="triangle"/>
+            <a:tailEnd type="triangle"/>
+          </a:ln>
+        </p:spPr>
+        <p:style>
+          <a:lnRef idx="1">
+            <a:schemeClr val="accent1"/>
+          </a:lnRef>
+          <a:fillRef idx="0">
+            <a:schemeClr val="accent1"/>
+          </a:fillRef>
+          <a:effectRef idx="0">
+            <a:schemeClr val="accent1"/>
+          </a:effectRef>
+          <a:fontRef idx="minor">
+            <a:schemeClr val="tx1"/>
+          </a:fontRef>
+        </p:style>
+      </p:cxnSp>
+      <p:sp>
+        <p:nvSpPr>
+          <p:cNvPr id="172" name="TextBox 171">
+            <a:extLst>
+              <a:ext uri="{FF2B5EF4-FFF2-40B4-BE49-F238E27FC236}">
+                <a16:creationId xmlns:a16="http://schemas.microsoft.com/office/drawing/2014/main" id="{778FD14D-3378-414D-968E-B55E27C7E1F4}"/>
+              </a:ext>
+            </a:extLst>
+          </p:cNvPr>
+          <p:cNvSpPr txBox="1"/>
+          <p:nvPr/>
+        </p:nvSpPr>
+        <p:spPr>
+          <a:xfrm>
+            <a:off x="22064291" y="11659066"/>
+            <a:ext cx="1989181" cy="523220"/>
+          </a:xfrm>
+          <a:prstGeom prst="rect">
+            <a:avLst/>
+          </a:prstGeom>
+          <a:noFill/>
+        </p:spPr>
+        <p:txBody>
+          <a:bodyPr wrap="square" rtlCol="0">
+            <a:spAutoFit/>
+          </a:bodyPr>
+          <a:lstStyle/>
+          <a:p>
+            <a:pPr algn="ctr"/>
+            <a:r>
+              <a:rPr lang="en-US" sz="2800" dirty="0">
+                <a:latin typeface="Helvetica" pitchFamily="2" charset="0"/>
+              </a:rPr>
+              <a:t>26</a:t>
+            </a:r>
+          </a:p>
+        </p:txBody>
+      </p:sp>
+      <p:sp>
+        <p:nvSpPr>
+          <p:cNvPr id="173" name="Oval 172">
+            <a:extLst>
+              <a:ext uri="{FF2B5EF4-FFF2-40B4-BE49-F238E27FC236}">
+                <a16:creationId xmlns:a16="http://schemas.microsoft.com/office/drawing/2014/main" id="{DAE40565-D81C-BF40-908A-B3B3B11C7168}"/>
+              </a:ext>
+            </a:extLst>
+          </p:cNvPr>
+          <p:cNvSpPr>
+            <a:spLocks noChangeAspect="1"/>
+          </p:cNvSpPr>
+          <p:nvPr/>
+        </p:nvSpPr>
+        <p:spPr>
+          <a:xfrm>
+            <a:off x="15700828" y="11645482"/>
+            <a:ext cx="1280160" cy="1280160"/>
+          </a:xfrm>
+          <a:prstGeom prst="ellipse">
+            <a:avLst/>
+          </a:prstGeom>
+          <a:noFill/>
+          <a:ln w="25400">
+            <a:solidFill>
+              <a:schemeClr val="accent6">
+                <a:lumMod val="75000"/>
+              </a:schemeClr>
+            </a:solidFill>
+          </a:ln>
+        </p:spPr>
+        <p:style>
+          <a:lnRef idx="2">
+            <a:schemeClr val="accent1">
+              <a:shade val="50000"/>
+            </a:schemeClr>
+          </a:lnRef>
+          <a:fillRef idx="1">
+            <a:schemeClr val="accent1"/>
+          </a:fillRef>
+          <a:effectRef idx="0">
+            <a:schemeClr val="accent1"/>
+          </a:effectRef>
+          <a:fontRef idx="minor">
+            <a:schemeClr val="lt1"/>
+          </a:fontRef>
+        </p:style>
+        <p:txBody>
+          <a:bodyPr rtlCol="0" anchor="ctr"/>
+          <a:lstStyle/>
+          <a:p>
+            <a:pPr algn="ctr"/>
+            <a:endParaRPr lang="en-US">
+              <a:solidFill>
+                <a:schemeClr val="accent6">
+                  <a:lumMod val="75000"/>
+                </a:schemeClr>
+              </a:solidFill>
+            </a:endParaRPr>
+          </a:p>
+        </p:txBody>
+      </p:sp>
+      <p:sp>
+        <p:nvSpPr>
+          <p:cNvPr id="174" name="TextBox 173">
+            <a:extLst>
+              <a:ext uri="{FF2B5EF4-FFF2-40B4-BE49-F238E27FC236}">
+                <a16:creationId xmlns:a16="http://schemas.microsoft.com/office/drawing/2014/main" id="{7D0CC174-F8EB-004B-80F0-01EB21FBF5A1}"/>
+              </a:ext>
+            </a:extLst>
+          </p:cNvPr>
+          <p:cNvSpPr txBox="1"/>
+          <p:nvPr/>
+        </p:nvSpPr>
+        <p:spPr>
+          <a:xfrm>
+            <a:off x="15717363" y="12085260"/>
+            <a:ext cx="1321904" cy="646331"/>
+          </a:xfrm>
+          <a:prstGeom prst="rect">
+            <a:avLst/>
+          </a:prstGeom>
+          <a:noFill/>
+        </p:spPr>
+        <p:txBody>
+          <a:bodyPr wrap="square" rtlCol="0">
+            <a:spAutoFit/>
+          </a:bodyPr>
+          <a:lstStyle/>
+          <a:p>
+            <a:pPr algn="ctr"/>
+            <a:r>
+              <a:rPr lang="en-US" dirty="0">
+                <a:latin typeface="Helvetica" pitchFamily="2" charset="0"/>
+              </a:rPr>
+              <a:t>Salmon River</a:t>
+            </a:r>
+          </a:p>
+        </p:txBody>
+      </p:sp>
+      <p:cxnSp>
+        <p:nvCxnSpPr>
+          <p:cNvPr id="175" name="Straight Arrow Connector 174">
+            <a:extLst>
+              <a:ext uri="{FF2B5EF4-FFF2-40B4-BE49-F238E27FC236}">
+                <a16:creationId xmlns:a16="http://schemas.microsoft.com/office/drawing/2014/main" id="{09EF4F5F-E648-6545-AA89-4C90BF14B409}"/>
+              </a:ext>
+            </a:extLst>
+          </p:cNvPr>
+          <p:cNvCxnSpPr>
+            <a:cxnSpLocks/>
+            <a:stCxn id="174" idx="3"/>
+            <a:endCxn id="141" idx="3"/>
+          </p:cNvCxnSpPr>
+          <p:nvPr/>
+        </p:nvCxnSpPr>
+        <p:spPr>
+          <a:xfrm flipV="1">
+            <a:off x="17039267" y="10626261"/>
+            <a:ext cx="2067074" cy="1782165"/>
+          </a:xfrm>
+          <a:prstGeom prst="straightConnector1">
+            <a:avLst/>
+          </a:prstGeom>
+          <a:ln>
+            <a:solidFill>
+              <a:schemeClr val="tx1"/>
+            </a:solidFill>
+            <a:headEnd type="triangle"/>
+            <a:tailEnd type="triangle"/>
+          </a:ln>
+        </p:spPr>
+        <p:style>
+          <a:lnRef idx="1">
+            <a:schemeClr val="accent1"/>
+          </a:lnRef>
+          <a:fillRef idx="0">
+            <a:schemeClr val="accent1"/>
+          </a:fillRef>
+          <a:effectRef idx="0">
+            <a:schemeClr val="accent1"/>
+          </a:effectRef>
+          <a:fontRef idx="minor">
+            <a:schemeClr val="tx1"/>
+          </a:fontRef>
+        </p:style>
+      </p:cxnSp>
+      <p:sp>
+        <p:nvSpPr>
+          <p:cNvPr id="176" name="TextBox 175">
+            <a:extLst>
+              <a:ext uri="{FF2B5EF4-FFF2-40B4-BE49-F238E27FC236}">
+                <a16:creationId xmlns:a16="http://schemas.microsoft.com/office/drawing/2014/main" id="{C635CBF9-0F4E-E647-816F-36421F9AA98A}"/>
+              </a:ext>
+            </a:extLst>
+          </p:cNvPr>
+          <p:cNvSpPr txBox="1"/>
+          <p:nvPr/>
+        </p:nvSpPr>
+        <p:spPr>
+          <a:xfrm>
+            <a:off x="15382812" y="11649892"/>
+            <a:ext cx="1989181" cy="523220"/>
+          </a:xfrm>
+          <a:prstGeom prst="rect">
+            <a:avLst/>
+          </a:prstGeom>
+          <a:noFill/>
+        </p:spPr>
+        <p:txBody>
+          <a:bodyPr wrap="square" rtlCol="0">
+            <a:spAutoFit/>
+          </a:bodyPr>
+          <a:lstStyle/>
+          <a:p>
+            <a:pPr algn="ctr"/>
+            <a:r>
+              <a:rPr lang="en-US" sz="2800" dirty="0">
+                <a:latin typeface="Helvetica" pitchFamily="2" charset="0"/>
+              </a:rPr>
+              <a:t>24</a:t>
+            </a:r>
+          </a:p>
+        </p:txBody>
+      </p:sp>
+      <p:sp>
+        <p:nvSpPr>
+          <p:cNvPr id="177" name="Oval 176">
+            <a:extLst>
+              <a:ext uri="{FF2B5EF4-FFF2-40B4-BE49-F238E27FC236}">
+                <a16:creationId xmlns:a16="http://schemas.microsoft.com/office/drawing/2014/main" id="{58136063-273D-FD4F-B197-584227E2C068}"/>
+              </a:ext>
+            </a:extLst>
+          </p:cNvPr>
+          <p:cNvSpPr>
+            <a:spLocks noChangeAspect="1"/>
+          </p:cNvSpPr>
+          <p:nvPr/>
+        </p:nvSpPr>
+        <p:spPr>
+          <a:xfrm>
+            <a:off x="22139853" y="7521080"/>
+            <a:ext cx="1280160" cy="1280160"/>
+          </a:xfrm>
+          <a:prstGeom prst="ellipse">
+            <a:avLst/>
+          </a:prstGeom>
+          <a:noFill/>
+          <a:ln w="25400">
+            <a:solidFill>
+              <a:schemeClr val="accent6">
+                <a:lumMod val="75000"/>
+              </a:schemeClr>
+            </a:solidFill>
+          </a:ln>
+        </p:spPr>
+        <p:style>
+          <a:lnRef idx="2">
+            <a:schemeClr val="accent1">
+              <a:shade val="50000"/>
+            </a:schemeClr>
+          </a:lnRef>
+          <a:fillRef idx="1">
+            <a:schemeClr val="accent1"/>
+          </a:fillRef>
+          <a:effectRef idx="0">
+            <a:schemeClr val="accent1"/>
+          </a:effectRef>
+          <a:fontRef idx="minor">
+            <a:schemeClr val="lt1"/>
+          </a:fontRef>
+        </p:style>
+        <p:txBody>
+          <a:bodyPr rtlCol="0" anchor="ctr"/>
+          <a:lstStyle/>
+          <a:p>
+            <a:pPr algn="ctr"/>
+            <a:endParaRPr lang="en-US">
+              <a:solidFill>
+                <a:schemeClr val="accent6">
+                  <a:lumMod val="75000"/>
+                </a:schemeClr>
+              </a:solidFill>
+            </a:endParaRPr>
+          </a:p>
+        </p:txBody>
+      </p:sp>
+      <p:sp>
+        <p:nvSpPr>
+          <p:cNvPr id="178" name="TextBox 177">
+            <a:extLst>
+              <a:ext uri="{FF2B5EF4-FFF2-40B4-BE49-F238E27FC236}">
+                <a16:creationId xmlns:a16="http://schemas.microsoft.com/office/drawing/2014/main" id="{DEFF2DBF-3284-224B-ADD9-13910E00A44E}"/>
+              </a:ext>
+            </a:extLst>
+          </p:cNvPr>
+          <p:cNvSpPr txBox="1"/>
+          <p:nvPr/>
+        </p:nvSpPr>
+        <p:spPr>
+          <a:xfrm>
+            <a:off x="22128679" y="7905440"/>
+            <a:ext cx="1321904" cy="646331"/>
+          </a:xfrm>
+          <a:prstGeom prst="rect">
+            <a:avLst/>
+          </a:prstGeom>
+          <a:noFill/>
+        </p:spPr>
+        <p:txBody>
+          <a:bodyPr wrap="square" rtlCol="0">
+            <a:spAutoFit/>
+          </a:bodyPr>
+          <a:lstStyle/>
+          <a:p>
+            <a:pPr algn="ctr"/>
+            <a:r>
+              <a:rPr lang="en-US" dirty="0">
+                <a:latin typeface="Helvetica" pitchFamily="2" charset="0"/>
+              </a:rPr>
+              <a:t>Clearwater River</a:t>
+            </a:r>
+          </a:p>
+        </p:txBody>
+      </p:sp>
+      <p:cxnSp>
+        <p:nvCxnSpPr>
+          <p:cNvPr id="179" name="Straight Arrow Connector 178">
+            <a:extLst>
+              <a:ext uri="{FF2B5EF4-FFF2-40B4-BE49-F238E27FC236}">
+                <a16:creationId xmlns:a16="http://schemas.microsoft.com/office/drawing/2014/main" id="{8B29ACB6-C9D1-7443-86FB-6D5C544AC74D}"/>
+              </a:ext>
+            </a:extLst>
+          </p:cNvPr>
+          <p:cNvCxnSpPr>
+            <a:cxnSpLocks/>
+            <a:stCxn id="177" idx="3"/>
+            <a:endCxn id="141" idx="6"/>
+          </p:cNvCxnSpPr>
+          <p:nvPr/>
+        </p:nvCxnSpPr>
+        <p:spPr>
+          <a:xfrm flipH="1">
+            <a:off x="20667319" y="8613765"/>
+            <a:ext cx="1660009" cy="1365918"/>
+          </a:xfrm>
+          <a:prstGeom prst="straightConnector1">
+            <a:avLst/>
+          </a:prstGeom>
+          <a:ln>
+            <a:solidFill>
+              <a:schemeClr val="tx1"/>
+            </a:solidFill>
+            <a:headEnd type="triangle"/>
+            <a:tailEnd type="triangle"/>
+          </a:ln>
+        </p:spPr>
+        <p:style>
+          <a:lnRef idx="1">
+            <a:schemeClr val="accent1"/>
+          </a:lnRef>
+          <a:fillRef idx="0">
+            <a:schemeClr val="accent1"/>
+          </a:fillRef>
+          <a:effectRef idx="0">
+            <a:schemeClr val="accent1"/>
+          </a:effectRef>
+          <a:fontRef idx="minor">
+            <a:schemeClr val="tx1"/>
+          </a:fontRef>
+        </p:style>
+      </p:cxnSp>
+      <p:sp>
+        <p:nvSpPr>
+          <p:cNvPr id="180" name="TextBox 179">
+            <a:extLst>
+              <a:ext uri="{FF2B5EF4-FFF2-40B4-BE49-F238E27FC236}">
+                <a16:creationId xmlns:a16="http://schemas.microsoft.com/office/drawing/2014/main" id="{68166CA7-2404-A547-BB65-20C4E768DF73}"/>
+              </a:ext>
+            </a:extLst>
+          </p:cNvPr>
+          <p:cNvSpPr txBox="1"/>
+          <p:nvPr/>
+        </p:nvSpPr>
+        <p:spPr>
+          <a:xfrm>
+            <a:off x="21795040" y="7521080"/>
+            <a:ext cx="1989181" cy="523220"/>
+          </a:xfrm>
+          <a:prstGeom prst="rect">
+            <a:avLst/>
+          </a:prstGeom>
+          <a:noFill/>
+        </p:spPr>
+        <p:txBody>
+          <a:bodyPr wrap="square" rtlCol="0">
+            <a:spAutoFit/>
+          </a:bodyPr>
+          <a:lstStyle/>
+          <a:p>
+            <a:pPr algn="ctr"/>
+            <a:r>
+              <a:rPr lang="en-US" sz="2800" dirty="0">
+                <a:latin typeface="Helvetica" pitchFamily="2" charset="0"/>
+              </a:rPr>
+              <a:t>23</a:t>
+            </a:r>
+          </a:p>
+        </p:txBody>
+      </p:sp>
+      <p:sp>
+        <p:nvSpPr>
+          <p:cNvPr id="185" name="Oval 184">
+            <a:extLst>
+              <a:ext uri="{FF2B5EF4-FFF2-40B4-BE49-F238E27FC236}">
+                <a16:creationId xmlns:a16="http://schemas.microsoft.com/office/drawing/2014/main" id="{7FE45F65-098F-E844-9E51-3202D7FAADB0}"/>
+              </a:ext>
+            </a:extLst>
+          </p:cNvPr>
+          <p:cNvSpPr>
+            <a:spLocks noChangeAspect="1"/>
+          </p:cNvSpPr>
+          <p:nvPr/>
+        </p:nvSpPr>
+        <p:spPr>
+          <a:xfrm>
+            <a:off x="19119337" y="6830313"/>
+            <a:ext cx="1280160" cy="1280160"/>
+          </a:xfrm>
+          <a:prstGeom prst="ellipse">
+            <a:avLst/>
+          </a:prstGeom>
+          <a:noFill/>
+          <a:ln w="25400">
+            <a:solidFill>
+              <a:schemeClr val="accent6">
+                <a:lumMod val="75000"/>
+              </a:schemeClr>
+            </a:solidFill>
+          </a:ln>
+        </p:spPr>
+        <p:style>
+          <a:lnRef idx="2">
+            <a:schemeClr val="accent1">
+              <a:shade val="50000"/>
+            </a:schemeClr>
+          </a:lnRef>
+          <a:fillRef idx="1">
+            <a:schemeClr val="accent1"/>
+          </a:fillRef>
+          <a:effectRef idx="0">
+            <a:schemeClr val="accent1"/>
+          </a:effectRef>
+          <a:fontRef idx="minor">
+            <a:schemeClr val="lt1"/>
+          </a:fontRef>
+        </p:style>
+        <p:txBody>
+          <a:bodyPr rtlCol="0" anchor="ctr"/>
+          <a:lstStyle/>
+          <a:p>
+            <a:pPr algn="ctr"/>
+            <a:endParaRPr lang="en-US">
+              <a:solidFill>
+                <a:schemeClr val="accent6">
+                  <a:lumMod val="75000"/>
+                </a:schemeClr>
+              </a:solidFill>
+            </a:endParaRPr>
+          </a:p>
+        </p:txBody>
+      </p:sp>
+      <p:sp>
+        <p:nvSpPr>
+          <p:cNvPr id="186" name="TextBox 185">
+            <a:extLst>
+              <a:ext uri="{FF2B5EF4-FFF2-40B4-BE49-F238E27FC236}">
+                <a16:creationId xmlns:a16="http://schemas.microsoft.com/office/drawing/2014/main" id="{6A66F177-CB6D-9340-AD60-EC0C603EDF77}"/>
+              </a:ext>
+            </a:extLst>
+          </p:cNvPr>
+          <p:cNvSpPr txBox="1"/>
+          <p:nvPr/>
+        </p:nvSpPr>
+        <p:spPr>
+          <a:xfrm>
+            <a:off x="19108163" y="7214673"/>
+            <a:ext cx="1321904" cy="646331"/>
+          </a:xfrm>
+          <a:prstGeom prst="rect">
+            <a:avLst/>
+          </a:prstGeom>
+          <a:noFill/>
+        </p:spPr>
+        <p:txBody>
+          <a:bodyPr wrap="square" rtlCol="0">
+            <a:spAutoFit/>
+          </a:bodyPr>
+          <a:lstStyle/>
+          <a:p>
+            <a:pPr algn="ctr"/>
+            <a:r>
+              <a:rPr lang="en-US" dirty="0">
+                <a:latin typeface="Helvetica" pitchFamily="2" charset="0"/>
+              </a:rPr>
+              <a:t>Asotin Creek</a:t>
+            </a:r>
+          </a:p>
+        </p:txBody>
+      </p:sp>
+      <p:cxnSp>
+        <p:nvCxnSpPr>
+          <p:cNvPr id="187" name="Straight Arrow Connector 186">
+            <a:extLst>
+              <a:ext uri="{FF2B5EF4-FFF2-40B4-BE49-F238E27FC236}">
+                <a16:creationId xmlns:a16="http://schemas.microsoft.com/office/drawing/2014/main" id="{C5FD74A7-88A4-5D4A-A551-8C767010CF22}"/>
+              </a:ext>
+            </a:extLst>
+          </p:cNvPr>
+          <p:cNvCxnSpPr>
+            <a:cxnSpLocks/>
+            <a:stCxn id="185" idx="4"/>
+            <a:endCxn id="141" idx="0"/>
+          </p:cNvCxnSpPr>
+          <p:nvPr/>
+        </p:nvCxnSpPr>
+        <p:spPr>
+          <a:xfrm flipH="1">
+            <a:off x="19752919" y="8110473"/>
+            <a:ext cx="6498" cy="954810"/>
+          </a:xfrm>
+          <a:prstGeom prst="straightConnector1">
+            <a:avLst/>
+          </a:prstGeom>
+          <a:ln>
+            <a:solidFill>
+              <a:schemeClr val="tx1"/>
+            </a:solidFill>
+            <a:headEnd type="triangle"/>
+            <a:tailEnd type="triangle"/>
+          </a:ln>
+        </p:spPr>
+        <p:style>
+          <a:lnRef idx="1">
+            <a:schemeClr val="accent1"/>
+          </a:lnRef>
+          <a:fillRef idx="0">
+            <a:schemeClr val="accent1"/>
+          </a:fillRef>
+          <a:effectRef idx="0">
+            <a:schemeClr val="accent1"/>
+          </a:effectRef>
+          <a:fontRef idx="minor">
+            <a:schemeClr val="tx1"/>
+          </a:fontRef>
+        </p:style>
+      </p:cxnSp>
+      <p:sp>
+        <p:nvSpPr>
+          <p:cNvPr id="188" name="Oval 187">
+            <a:extLst>
+              <a:ext uri="{FF2B5EF4-FFF2-40B4-BE49-F238E27FC236}">
+                <a16:creationId xmlns:a16="http://schemas.microsoft.com/office/drawing/2014/main" id="{E539CCD5-7968-AC45-8161-B34FAA61C5A6}"/>
+              </a:ext>
+            </a:extLst>
+          </p:cNvPr>
+          <p:cNvSpPr>
+            <a:spLocks noChangeAspect="1"/>
+          </p:cNvSpPr>
+          <p:nvPr/>
+        </p:nvSpPr>
+        <p:spPr>
+          <a:xfrm>
+            <a:off x="22692937" y="656684"/>
+            <a:ext cx="1280160" cy="1280160"/>
+          </a:xfrm>
+          <a:prstGeom prst="ellipse">
+            <a:avLst/>
+          </a:prstGeom>
+          <a:noFill/>
+          <a:ln w="25400">
+            <a:solidFill>
+              <a:schemeClr val="accent6">
+                <a:lumMod val="75000"/>
+              </a:schemeClr>
+            </a:solidFill>
+          </a:ln>
+        </p:spPr>
+        <p:style>
+          <a:lnRef idx="2">
+            <a:schemeClr val="accent1">
+              <a:shade val="50000"/>
+            </a:schemeClr>
+          </a:lnRef>
+          <a:fillRef idx="1">
+            <a:schemeClr val="accent1"/>
+          </a:fillRef>
+          <a:effectRef idx="0">
+            <a:schemeClr val="accent1"/>
+          </a:effectRef>
+          <a:fontRef idx="minor">
+            <a:schemeClr val="lt1"/>
+          </a:fontRef>
+        </p:style>
+        <p:txBody>
+          <a:bodyPr rtlCol="0" anchor="ctr"/>
+          <a:lstStyle/>
+          <a:p>
+            <a:pPr algn="ctr"/>
+            <a:endParaRPr lang="en-US">
+              <a:solidFill>
+                <a:schemeClr val="accent6">
+                  <a:lumMod val="75000"/>
+                </a:schemeClr>
+              </a:solidFill>
+            </a:endParaRPr>
+          </a:p>
+        </p:txBody>
+      </p:sp>
+      <p:sp>
+        <p:nvSpPr>
+          <p:cNvPr id="189" name="TextBox 188">
+            <a:extLst>
+              <a:ext uri="{FF2B5EF4-FFF2-40B4-BE49-F238E27FC236}">
+                <a16:creationId xmlns:a16="http://schemas.microsoft.com/office/drawing/2014/main" id="{22970387-ED01-354C-B6F5-82F767464FDF}"/>
+              </a:ext>
+            </a:extLst>
+          </p:cNvPr>
+          <p:cNvSpPr txBox="1"/>
+          <p:nvPr/>
+        </p:nvSpPr>
+        <p:spPr>
+          <a:xfrm>
+            <a:off x="22737181" y="1041044"/>
+            <a:ext cx="1321904" cy="646331"/>
+          </a:xfrm>
+          <a:prstGeom prst="rect">
+            <a:avLst/>
+          </a:prstGeom>
+          <a:noFill/>
+        </p:spPr>
+        <p:txBody>
+          <a:bodyPr wrap="square" rtlCol="0">
+            <a:spAutoFit/>
+          </a:bodyPr>
+          <a:lstStyle/>
+          <a:p>
+            <a:pPr algn="ctr"/>
+            <a:r>
+              <a:rPr lang="en-US" dirty="0">
+                <a:latin typeface="Helvetica" pitchFamily="2" charset="0"/>
+              </a:rPr>
+              <a:t>Okanogan River</a:t>
+            </a:r>
+          </a:p>
+        </p:txBody>
+      </p:sp>
+      <p:cxnSp>
+        <p:nvCxnSpPr>
+          <p:cNvPr id="190" name="Straight Arrow Connector 189">
+            <a:extLst>
+              <a:ext uri="{FF2B5EF4-FFF2-40B4-BE49-F238E27FC236}">
+                <a16:creationId xmlns:a16="http://schemas.microsoft.com/office/drawing/2014/main" id="{2E6F5F22-FBEA-0A43-BFF7-694E09949702}"/>
+              </a:ext>
+            </a:extLst>
+          </p:cNvPr>
+          <p:cNvCxnSpPr>
+            <a:cxnSpLocks/>
+            <a:stCxn id="188" idx="3"/>
+            <a:endCxn id="131" idx="0"/>
+          </p:cNvCxnSpPr>
+          <p:nvPr/>
+        </p:nvCxnSpPr>
+        <p:spPr>
+          <a:xfrm flipH="1">
+            <a:off x="22022941" y="1749369"/>
+            <a:ext cx="857471" cy="424977"/>
+          </a:xfrm>
+          <a:prstGeom prst="straightConnector1">
+            <a:avLst/>
+          </a:prstGeom>
+          <a:ln>
+            <a:solidFill>
+              <a:schemeClr val="tx1"/>
+            </a:solidFill>
+            <a:headEnd type="triangle"/>
+            <a:tailEnd type="triangle"/>
+          </a:ln>
+        </p:spPr>
+        <p:style>
+          <a:lnRef idx="1">
+            <a:schemeClr val="accent1"/>
+          </a:lnRef>
+          <a:fillRef idx="0">
+            <a:schemeClr val="accent1"/>
+          </a:fillRef>
+          <a:effectRef idx="0">
+            <a:schemeClr val="accent1"/>
+          </a:effectRef>
+          <a:fontRef idx="minor">
+            <a:schemeClr val="tx1"/>
+          </a:fontRef>
+        </p:style>
+      </p:cxnSp>
+      <p:sp>
+        <p:nvSpPr>
+          <p:cNvPr id="191" name="Oval 190">
+            <a:extLst>
+              <a:ext uri="{FF2B5EF4-FFF2-40B4-BE49-F238E27FC236}">
+                <a16:creationId xmlns:a16="http://schemas.microsoft.com/office/drawing/2014/main" id="{DE3514AB-2091-754F-8596-5848DD3E9BC7}"/>
+              </a:ext>
+            </a:extLst>
+          </p:cNvPr>
+          <p:cNvSpPr>
+            <a:spLocks noChangeAspect="1"/>
+          </p:cNvSpPr>
+          <p:nvPr/>
+        </p:nvSpPr>
+        <p:spPr>
+          <a:xfrm>
+            <a:off x="21657181" y="4867354"/>
+            <a:ext cx="1280160" cy="1280160"/>
+          </a:xfrm>
+          <a:prstGeom prst="ellipse">
+            <a:avLst/>
+          </a:prstGeom>
+          <a:noFill/>
+          <a:ln w="25400">
+            <a:solidFill>
+              <a:schemeClr val="accent6">
+                <a:lumMod val="75000"/>
+              </a:schemeClr>
+            </a:solidFill>
+          </a:ln>
+        </p:spPr>
+        <p:style>
+          <a:lnRef idx="2">
+            <a:schemeClr val="accent1">
+              <a:shade val="50000"/>
+            </a:schemeClr>
+          </a:lnRef>
+          <a:fillRef idx="1">
+            <a:schemeClr val="accent1"/>
+          </a:fillRef>
+          <a:effectRef idx="0">
+            <a:schemeClr val="accent1"/>
+          </a:effectRef>
+          <a:fontRef idx="minor">
+            <a:schemeClr val="lt1"/>
+          </a:fontRef>
+        </p:style>
+        <p:txBody>
+          <a:bodyPr rtlCol="0" anchor="ctr"/>
+          <a:lstStyle/>
+          <a:p>
+            <a:pPr algn="ctr"/>
+            <a:endParaRPr lang="en-US">
+              <a:solidFill>
+                <a:schemeClr val="accent6">
+                  <a:lumMod val="75000"/>
+                </a:schemeClr>
+              </a:solidFill>
+            </a:endParaRPr>
+          </a:p>
+        </p:txBody>
+      </p:sp>
+      <p:sp>
+        <p:nvSpPr>
+          <p:cNvPr id="192" name="TextBox 191">
+            <a:extLst>
+              <a:ext uri="{FF2B5EF4-FFF2-40B4-BE49-F238E27FC236}">
+                <a16:creationId xmlns:a16="http://schemas.microsoft.com/office/drawing/2014/main" id="{005B5A51-1AD0-474C-9515-1A113A560499}"/>
+              </a:ext>
+            </a:extLst>
+          </p:cNvPr>
+          <p:cNvSpPr txBox="1"/>
+          <p:nvPr/>
+        </p:nvSpPr>
+        <p:spPr>
+          <a:xfrm>
+            <a:off x="21673716" y="5251714"/>
+            <a:ext cx="1321904" cy="646331"/>
+          </a:xfrm>
+          <a:prstGeom prst="rect">
+            <a:avLst/>
+          </a:prstGeom>
+          <a:noFill/>
+        </p:spPr>
+        <p:txBody>
+          <a:bodyPr wrap="square" rtlCol="0">
+            <a:spAutoFit/>
+          </a:bodyPr>
+          <a:lstStyle/>
+          <a:p>
+            <a:pPr algn="ctr"/>
+            <a:r>
+              <a:rPr lang="en-US" dirty="0">
+                <a:latin typeface="Helvetica" pitchFamily="2" charset="0"/>
+              </a:rPr>
+              <a:t>Methow River</a:t>
+            </a:r>
+          </a:p>
+        </p:txBody>
+      </p:sp>
+      <p:cxnSp>
+        <p:nvCxnSpPr>
+          <p:cNvPr id="193" name="Straight Arrow Connector 192">
+            <a:extLst>
+              <a:ext uri="{FF2B5EF4-FFF2-40B4-BE49-F238E27FC236}">
+                <a16:creationId xmlns:a16="http://schemas.microsoft.com/office/drawing/2014/main" id="{2ABFBA8E-5626-0E43-B4D0-735DD68F108D}"/>
+              </a:ext>
+            </a:extLst>
+          </p:cNvPr>
+          <p:cNvCxnSpPr>
+            <a:cxnSpLocks/>
+            <a:stCxn id="191" idx="0"/>
+            <a:endCxn id="131" idx="4"/>
+          </p:cNvCxnSpPr>
+          <p:nvPr/>
+        </p:nvCxnSpPr>
+        <p:spPr>
+          <a:xfrm flipH="1" flipV="1">
+            <a:off x="22022941" y="4003146"/>
+            <a:ext cx="274320" cy="864208"/>
+          </a:xfrm>
+          <a:prstGeom prst="straightConnector1">
+            <a:avLst/>
+          </a:prstGeom>
+          <a:ln>
+            <a:solidFill>
+              <a:schemeClr val="tx1"/>
+            </a:solidFill>
+            <a:headEnd type="triangle"/>
+            <a:tailEnd type="triangle"/>
+          </a:ln>
+        </p:spPr>
+        <p:style>
+          <a:lnRef idx="1">
+            <a:schemeClr val="accent1"/>
+          </a:lnRef>
+          <a:fillRef idx="0">
+            <a:schemeClr val="accent1"/>
+          </a:fillRef>
+          <a:effectRef idx="0">
+            <a:schemeClr val="accent1"/>
+          </a:effectRef>
+          <a:fontRef idx="minor">
+            <a:schemeClr val="tx1"/>
+          </a:fontRef>
+        </p:style>
+      </p:cxnSp>
+      <p:cxnSp>
+        <p:nvCxnSpPr>
+          <p:cNvPr id="194" name="Straight Arrow Connector 193">
+            <a:extLst>
+              <a:ext uri="{FF2B5EF4-FFF2-40B4-BE49-F238E27FC236}">
+                <a16:creationId xmlns:a16="http://schemas.microsoft.com/office/drawing/2014/main" id="{43299BB8-2C4B-4E44-84C1-388E64F6DA27}"/>
+              </a:ext>
+            </a:extLst>
+          </p:cNvPr>
+          <p:cNvCxnSpPr>
+            <a:cxnSpLocks/>
+            <a:stCxn id="107" idx="6"/>
+            <a:endCxn id="119" idx="2"/>
+          </p:cNvCxnSpPr>
+          <p:nvPr/>
+        </p:nvCxnSpPr>
+        <p:spPr>
+          <a:xfrm flipV="1">
+            <a:off x="14404578" y="3055088"/>
+            <a:ext cx="2385638" cy="33658"/>
+          </a:xfrm>
+          <a:prstGeom prst="straightConnector1">
+            <a:avLst/>
+          </a:prstGeom>
+          <a:ln>
+            <a:solidFill>
+              <a:schemeClr val="tx1"/>
+            </a:solidFill>
+            <a:headEnd type="triangle"/>
+            <a:tailEnd type="triangle"/>
+          </a:ln>
+        </p:spPr>
+        <p:style>
+          <a:lnRef idx="1">
+            <a:schemeClr val="accent1"/>
+          </a:lnRef>
+          <a:fillRef idx="0">
+            <a:schemeClr val="accent1"/>
+          </a:fillRef>
+          <a:effectRef idx="0">
+            <a:schemeClr val="accent1"/>
+          </a:effectRef>
+          <a:fontRef idx="minor">
+            <a:schemeClr val="tx1"/>
+          </a:fontRef>
+        </p:style>
+      </p:cxnSp>
+      <p:cxnSp>
+        <p:nvCxnSpPr>
+          <p:cNvPr id="195" name="Straight Arrow Connector 194">
+            <a:extLst>
+              <a:ext uri="{FF2B5EF4-FFF2-40B4-BE49-F238E27FC236}">
+                <a16:creationId xmlns:a16="http://schemas.microsoft.com/office/drawing/2014/main" id="{A120CDEB-FD02-3A44-95D6-BD2953A145C4}"/>
+              </a:ext>
+            </a:extLst>
+          </p:cNvPr>
+          <p:cNvCxnSpPr>
+            <a:cxnSpLocks/>
+            <a:stCxn id="119" idx="6"/>
+            <a:endCxn id="131" idx="2"/>
+          </p:cNvCxnSpPr>
+          <p:nvPr/>
+        </p:nvCxnSpPr>
+        <p:spPr>
+          <a:xfrm>
+            <a:off x="18619016" y="3055088"/>
+            <a:ext cx="2489525" cy="33658"/>
+          </a:xfrm>
+          <a:prstGeom prst="straightConnector1">
+            <a:avLst/>
+          </a:prstGeom>
+          <a:ln>
+            <a:solidFill>
+              <a:schemeClr val="tx1"/>
+            </a:solidFill>
+            <a:headEnd type="triangle"/>
+            <a:tailEnd type="triangle"/>
+          </a:ln>
+        </p:spPr>
+        <p:style>
+          <a:lnRef idx="1">
+            <a:schemeClr val="accent1"/>
+          </a:lnRef>
+          <a:fillRef idx="0">
+            <a:schemeClr val="accent1"/>
+          </a:fillRef>
+          <a:effectRef idx="0">
+            <a:schemeClr val="accent1"/>
+          </a:effectRef>
+          <a:fontRef idx="minor">
+            <a:schemeClr val="tx1"/>
+          </a:fontRef>
+        </p:style>
+      </p:cxnSp>
+      <p:cxnSp>
+        <p:nvCxnSpPr>
+          <p:cNvPr id="197" name="Straight Connector 196">
+            <a:extLst>
+              <a:ext uri="{FF2B5EF4-FFF2-40B4-BE49-F238E27FC236}">
+                <a16:creationId xmlns:a16="http://schemas.microsoft.com/office/drawing/2014/main" id="{26D6298C-E09B-2E45-B21D-428716FD8CA2}"/>
+              </a:ext>
+            </a:extLst>
+          </p:cNvPr>
+          <p:cNvCxnSpPr>
+            <a:cxnSpLocks/>
+          </p:cNvCxnSpPr>
+          <p:nvPr/>
+        </p:nvCxnSpPr>
+        <p:spPr>
+          <a:xfrm flipH="1">
+            <a:off x="15709184" y="2803464"/>
+            <a:ext cx="1" cy="644039"/>
+          </a:xfrm>
+          <a:prstGeom prst="line">
+            <a:avLst/>
+          </a:prstGeom>
+          <a:ln w="88900">
+            <a:solidFill>
+              <a:schemeClr val="tx1"/>
+            </a:solidFill>
+          </a:ln>
+        </p:spPr>
+        <p:style>
+          <a:lnRef idx="1">
+            <a:schemeClr val="accent1"/>
+          </a:lnRef>
+          <a:fillRef idx="0">
+            <a:schemeClr val="accent1"/>
+          </a:fillRef>
+          <a:effectRef idx="0">
+            <a:schemeClr val="accent1"/>
+          </a:effectRef>
+          <a:fontRef idx="minor">
+            <a:schemeClr val="tx1"/>
+          </a:fontRef>
+        </p:style>
+      </p:cxnSp>
+      <p:sp>
+        <p:nvSpPr>
+          <p:cNvPr id="198" name="TextBox 197">
+            <a:extLst>
+              <a:ext uri="{FF2B5EF4-FFF2-40B4-BE49-F238E27FC236}">
+                <a16:creationId xmlns:a16="http://schemas.microsoft.com/office/drawing/2014/main" id="{0CEFEDD2-16E0-7446-8A08-ACA7A51DB9C3}"/>
+              </a:ext>
+            </a:extLst>
+          </p:cNvPr>
+          <p:cNvSpPr txBox="1"/>
+          <p:nvPr/>
+        </p:nvSpPr>
+        <p:spPr>
+          <a:xfrm>
+            <a:off x="14704866" y="2318356"/>
+            <a:ext cx="1989181" cy="523220"/>
+          </a:xfrm>
+          <a:prstGeom prst="rect">
+            <a:avLst/>
+          </a:prstGeom>
+          <a:noFill/>
+        </p:spPr>
+        <p:txBody>
+          <a:bodyPr wrap="square" rtlCol="0">
+            <a:spAutoFit/>
+          </a:bodyPr>
+          <a:lstStyle/>
+          <a:p>
+            <a:pPr algn="ctr"/>
+            <a:r>
+              <a:rPr lang="en-US" sz="2800" dirty="0">
+                <a:latin typeface="Helvetica" pitchFamily="2" charset="0"/>
+              </a:rPr>
+              <a:t>RRE</a:t>
+            </a:r>
+          </a:p>
+        </p:txBody>
+      </p:sp>
+      <p:cxnSp>
+        <p:nvCxnSpPr>
+          <p:cNvPr id="199" name="Straight Connector 198">
+            <a:extLst>
+              <a:ext uri="{FF2B5EF4-FFF2-40B4-BE49-F238E27FC236}">
+                <a16:creationId xmlns:a16="http://schemas.microsoft.com/office/drawing/2014/main" id="{656FBDDF-6D98-DF49-9118-5058122896B1}"/>
+              </a:ext>
+            </a:extLst>
+          </p:cNvPr>
+          <p:cNvCxnSpPr>
+            <a:cxnSpLocks/>
+          </p:cNvCxnSpPr>
+          <p:nvPr/>
+        </p:nvCxnSpPr>
+        <p:spPr>
+          <a:xfrm flipH="1">
+            <a:off x="12165618" y="3783815"/>
+            <a:ext cx="1" cy="644039"/>
+          </a:xfrm>
+          <a:prstGeom prst="line">
+            <a:avLst/>
+          </a:prstGeom>
+          <a:ln w="88900">
+            <a:solidFill>
+              <a:schemeClr val="tx1"/>
+            </a:solidFill>
+          </a:ln>
+        </p:spPr>
+        <p:style>
+          <a:lnRef idx="1">
+            <a:schemeClr val="accent1"/>
+          </a:lnRef>
+          <a:fillRef idx="0">
+            <a:schemeClr val="accent1"/>
+          </a:fillRef>
+          <a:effectRef idx="0">
+            <a:schemeClr val="accent1"/>
+          </a:effectRef>
+          <a:fontRef idx="minor">
+            <a:schemeClr val="tx1"/>
+          </a:fontRef>
+        </p:style>
+      </p:cxnSp>
+      <p:sp>
+        <p:nvSpPr>
+          <p:cNvPr id="200" name="TextBox 199">
+            <a:extLst>
+              <a:ext uri="{FF2B5EF4-FFF2-40B4-BE49-F238E27FC236}">
+                <a16:creationId xmlns:a16="http://schemas.microsoft.com/office/drawing/2014/main" id="{AEBFAC46-ACCC-5B4A-ABC1-06391569127C}"/>
+              </a:ext>
+            </a:extLst>
+          </p:cNvPr>
+          <p:cNvSpPr txBox="1"/>
+          <p:nvPr/>
+        </p:nvSpPr>
+        <p:spPr>
+          <a:xfrm>
+            <a:off x="11161300" y="3243289"/>
+            <a:ext cx="1989181" cy="523220"/>
+          </a:xfrm>
+          <a:prstGeom prst="rect">
+            <a:avLst/>
+          </a:prstGeom>
+          <a:noFill/>
+        </p:spPr>
+        <p:txBody>
+          <a:bodyPr wrap="square" rtlCol="0">
+            <a:spAutoFit/>
+          </a:bodyPr>
+          <a:lstStyle/>
+          <a:p>
+            <a:pPr algn="ctr"/>
+            <a:r>
+              <a:rPr lang="en-US" sz="2800" dirty="0">
+                <a:latin typeface="Helvetica" pitchFamily="2" charset="0"/>
+              </a:rPr>
+              <a:t>RIS</a:t>
+            </a:r>
+          </a:p>
+        </p:txBody>
+      </p:sp>
+      <p:cxnSp>
+        <p:nvCxnSpPr>
+          <p:cNvPr id="201" name="Straight Connector 200">
+            <a:extLst>
+              <a:ext uri="{FF2B5EF4-FFF2-40B4-BE49-F238E27FC236}">
+                <a16:creationId xmlns:a16="http://schemas.microsoft.com/office/drawing/2014/main" id="{FF685D6E-43D1-794F-B38E-8DC853CA2CF0}"/>
+              </a:ext>
+            </a:extLst>
+          </p:cNvPr>
+          <p:cNvCxnSpPr>
+            <a:cxnSpLocks/>
+          </p:cNvCxnSpPr>
+          <p:nvPr/>
+        </p:nvCxnSpPr>
+        <p:spPr>
+          <a:xfrm flipH="1">
+            <a:off x="19968871" y="2703769"/>
+            <a:ext cx="1" cy="644039"/>
+          </a:xfrm>
+          <a:prstGeom prst="line">
+            <a:avLst/>
+          </a:prstGeom>
+          <a:ln w="88900">
+            <a:solidFill>
+              <a:schemeClr val="tx1"/>
+            </a:solidFill>
+          </a:ln>
+        </p:spPr>
+        <p:style>
+          <a:lnRef idx="1">
+            <a:schemeClr val="accent1"/>
+          </a:lnRef>
+          <a:fillRef idx="0">
+            <a:schemeClr val="accent1"/>
+          </a:fillRef>
+          <a:effectRef idx="0">
+            <a:schemeClr val="accent1"/>
+          </a:effectRef>
+          <a:fontRef idx="minor">
+            <a:schemeClr val="tx1"/>
+          </a:fontRef>
+        </p:style>
+      </p:cxnSp>
+      <p:sp>
+        <p:nvSpPr>
+          <p:cNvPr id="202" name="TextBox 201">
+            <a:extLst>
+              <a:ext uri="{FF2B5EF4-FFF2-40B4-BE49-F238E27FC236}">
+                <a16:creationId xmlns:a16="http://schemas.microsoft.com/office/drawing/2014/main" id="{11BFC322-D636-BD4A-8009-2AC94CF6D361}"/>
+              </a:ext>
+            </a:extLst>
+          </p:cNvPr>
+          <p:cNvSpPr txBox="1"/>
+          <p:nvPr/>
+        </p:nvSpPr>
+        <p:spPr>
+          <a:xfrm>
+            <a:off x="18964553" y="2218661"/>
+            <a:ext cx="1989181" cy="523220"/>
+          </a:xfrm>
+          <a:prstGeom prst="rect">
+            <a:avLst/>
+          </a:prstGeom>
+          <a:noFill/>
+        </p:spPr>
+        <p:txBody>
+          <a:bodyPr wrap="square" rtlCol="0">
+            <a:spAutoFit/>
+          </a:bodyPr>
+          <a:lstStyle/>
+          <a:p>
+            <a:pPr algn="ctr"/>
+            <a:r>
+              <a:rPr lang="en-US" sz="2800" dirty="0">
+                <a:latin typeface="Helvetica" pitchFamily="2" charset="0"/>
+              </a:rPr>
+              <a:t>WEL</a:t>
+            </a:r>
+          </a:p>
+        </p:txBody>
+      </p:sp>
+      <p:cxnSp>
+        <p:nvCxnSpPr>
+          <p:cNvPr id="203" name="Straight Arrow Connector 202">
+            <a:extLst>
+              <a:ext uri="{FF2B5EF4-FFF2-40B4-BE49-F238E27FC236}">
+                <a16:creationId xmlns:a16="http://schemas.microsoft.com/office/drawing/2014/main" id="{E9D99E63-A58C-1B4E-BAB2-A52F142CFA4D}"/>
+              </a:ext>
+            </a:extLst>
+          </p:cNvPr>
+          <p:cNvCxnSpPr>
+            <a:cxnSpLocks/>
+            <a:stCxn id="161" idx="4"/>
+            <a:endCxn id="119" idx="0"/>
+          </p:cNvCxnSpPr>
+          <p:nvPr/>
+        </p:nvCxnSpPr>
+        <p:spPr>
+          <a:xfrm flipH="1">
+            <a:off x="17704616" y="1771995"/>
+            <a:ext cx="45720" cy="368693"/>
+          </a:xfrm>
+          <a:prstGeom prst="straightConnector1">
+            <a:avLst/>
+          </a:prstGeom>
+          <a:ln>
+            <a:solidFill>
+              <a:schemeClr val="tx1"/>
+            </a:solidFill>
+            <a:headEnd type="triangle"/>
+            <a:tailEnd type="triangle"/>
+          </a:ln>
+        </p:spPr>
+        <p:style>
+          <a:lnRef idx="1">
+            <a:schemeClr val="accent1"/>
+          </a:lnRef>
+          <a:fillRef idx="0">
+            <a:schemeClr val="accent1"/>
+          </a:fillRef>
+          <a:effectRef idx="0">
+            <a:schemeClr val="accent1"/>
+          </a:effectRef>
+          <a:fontRef idx="minor">
+            <a:schemeClr val="tx1"/>
+          </a:fontRef>
+        </p:style>
+      </p:cxnSp>
+      <p:cxnSp>
+        <p:nvCxnSpPr>
+          <p:cNvPr id="204" name="Straight Arrow Connector 203">
+            <a:extLst>
+              <a:ext uri="{FF2B5EF4-FFF2-40B4-BE49-F238E27FC236}">
+                <a16:creationId xmlns:a16="http://schemas.microsoft.com/office/drawing/2014/main" id="{FC558146-FEE0-DD44-B0C0-04489782E12A}"/>
+              </a:ext>
+            </a:extLst>
+          </p:cNvPr>
+          <p:cNvCxnSpPr>
+            <a:cxnSpLocks/>
+          </p:cNvCxnSpPr>
+          <p:nvPr/>
+        </p:nvCxnSpPr>
+        <p:spPr>
+          <a:xfrm flipH="1" flipV="1">
+            <a:off x="11915684" y="1471012"/>
+            <a:ext cx="1035456" cy="936898"/>
+          </a:xfrm>
+          <a:prstGeom prst="straightConnector1">
+            <a:avLst/>
+          </a:prstGeom>
+          <a:ln>
+            <a:solidFill>
+              <a:schemeClr val="tx1"/>
+            </a:solidFill>
+            <a:headEnd type="triangle"/>
+            <a:tailEnd type="triangle"/>
+          </a:ln>
+        </p:spPr>
+        <p:style>
+          <a:lnRef idx="1">
+            <a:schemeClr val="accent1"/>
+          </a:lnRef>
+          <a:fillRef idx="0">
+            <a:schemeClr val="accent1"/>
+          </a:fillRef>
+          <a:effectRef idx="0">
+            <a:schemeClr val="accent1"/>
+          </a:effectRef>
+          <a:fontRef idx="minor">
+            <a:schemeClr val="tx1"/>
+          </a:fontRef>
+        </p:style>
+      </p:cxnSp>
+      <p:cxnSp>
+        <p:nvCxnSpPr>
+          <p:cNvPr id="210" name="Straight Arrow Connector 209">
+            <a:extLst>
+              <a:ext uri="{FF2B5EF4-FFF2-40B4-BE49-F238E27FC236}">
+                <a16:creationId xmlns:a16="http://schemas.microsoft.com/office/drawing/2014/main" id="{8A06E876-66C3-5D4F-B78F-4842AFF89A95}"/>
+              </a:ext>
+            </a:extLst>
+          </p:cNvPr>
+          <p:cNvCxnSpPr>
+            <a:cxnSpLocks/>
+            <a:stCxn id="141" idx="2"/>
+            <a:endCxn id="39" idx="6"/>
+          </p:cNvCxnSpPr>
+          <p:nvPr/>
+        </p:nvCxnSpPr>
+        <p:spPr>
+          <a:xfrm flipH="1" flipV="1">
+            <a:off x="14351895" y="9950118"/>
+            <a:ext cx="4486624" cy="29565"/>
+          </a:xfrm>
+          <a:prstGeom prst="straightConnector1">
+            <a:avLst/>
+          </a:prstGeom>
+          <a:ln>
+            <a:solidFill>
+              <a:schemeClr val="tx1"/>
+            </a:solidFill>
+            <a:headEnd type="triangle"/>
+            <a:tailEnd type="triangle"/>
+          </a:ln>
+        </p:spPr>
+        <p:style>
+          <a:lnRef idx="1">
+            <a:schemeClr val="accent1"/>
+          </a:lnRef>
+          <a:fillRef idx="0">
+            <a:schemeClr val="accent1"/>
+          </a:fillRef>
+          <a:effectRef idx="0">
+            <a:schemeClr val="accent1"/>
+          </a:effectRef>
+          <a:fontRef idx="minor">
+            <a:schemeClr val="tx1"/>
+          </a:fontRef>
+        </p:style>
+      </p:cxnSp>
+      <p:sp>
+        <p:nvSpPr>
+          <p:cNvPr id="229" name="TextBox 228">
+            <a:extLst>
+              <a:ext uri="{FF2B5EF4-FFF2-40B4-BE49-F238E27FC236}">
+                <a16:creationId xmlns:a16="http://schemas.microsoft.com/office/drawing/2014/main" id="{FBB6C17C-57DB-284B-AEE4-282B5AF71856}"/>
+              </a:ext>
+            </a:extLst>
+          </p:cNvPr>
+          <p:cNvSpPr txBox="1"/>
+          <p:nvPr/>
+        </p:nvSpPr>
+        <p:spPr>
+          <a:xfrm>
+            <a:off x="5273947" y="8641722"/>
+            <a:ext cx="1352661" cy="525686"/>
+          </a:xfrm>
+          <a:prstGeom prst="rect">
+            <a:avLst/>
+          </a:prstGeom>
+          <a:noFill/>
+        </p:spPr>
+        <p:txBody>
+          <a:bodyPr wrap="square" rtlCol="0">
+            <a:spAutoFit/>
+          </a:bodyPr>
+          <a:lstStyle/>
+          <a:p>
+            <a:pPr algn="ctr"/>
+            <a:r>
+              <a:rPr lang="en-US" sz="2800" dirty="0">
+                <a:latin typeface="Helvetica" pitchFamily="2" charset="0"/>
+              </a:rPr>
+              <a:t>14</a:t>
+            </a:r>
+          </a:p>
+        </p:txBody>
+      </p:sp>
+      <p:sp>
+        <p:nvSpPr>
+          <p:cNvPr id="230" name="TextBox 229">
+            <a:extLst>
+              <a:ext uri="{FF2B5EF4-FFF2-40B4-BE49-F238E27FC236}">
+                <a16:creationId xmlns:a16="http://schemas.microsoft.com/office/drawing/2014/main" id="{5759C397-0090-1B42-AF7D-9B6F927F0377}"/>
+              </a:ext>
+            </a:extLst>
+          </p:cNvPr>
+          <p:cNvSpPr txBox="1"/>
+          <p:nvPr/>
+        </p:nvSpPr>
+        <p:spPr>
+          <a:xfrm>
+            <a:off x="7114880" y="3667459"/>
+            <a:ext cx="1352661" cy="525686"/>
+          </a:xfrm>
+          <a:prstGeom prst="rect">
+            <a:avLst/>
+          </a:prstGeom>
+          <a:noFill/>
+        </p:spPr>
+        <p:txBody>
+          <a:bodyPr wrap="square" rtlCol="0">
+            <a:spAutoFit/>
+          </a:bodyPr>
+          <a:lstStyle/>
+          <a:p>
+            <a:pPr algn="ctr"/>
+            <a:r>
+              <a:rPr lang="en-US" sz="2800" dirty="0">
+                <a:latin typeface="Helvetica" pitchFamily="2" charset="0"/>
+              </a:rPr>
+              <a:t>15</a:t>
+            </a:r>
+          </a:p>
+        </p:txBody>
+      </p:sp>
+      <p:sp>
+        <p:nvSpPr>
+          <p:cNvPr id="232" name="TextBox 231">
+            <a:extLst>
+              <a:ext uri="{FF2B5EF4-FFF2-40B4-BE49-F238E27FC236}">
+                <a16:creationId xmlns:a16="http://schemas.microsoft.com/office/drawing/2014/main" id="{1261DC27-99E3-8449-84C9-2988268A26CB}"/>
+              </a:ext>
+            </a:extLst>
+          </p:cNvPr>
+          <p:cNvSpPr txBox="1"/>
+          <p:nvPr/>
+        </p:nvSpPr>
+        <p:spPr>
+          <a:xfrm>
+            <a:off x="7238538" y="9497779"/>
+            <a:ext cx="1352661" cy="525686"/>
+          </a:xfrm>
+          <a:prstGeom prst="rect">
+            <a:avLst/>
+          </a:prstGeom>
+          <a:noFill/>
+        </p:spPr>
+        <p:txBody>
+          <a:bodyPr wrap="square" rtlCol="0">
+            <a:spAutoFit/>
+          </a:bodyPr>
+          <a:lstStyle/>
+          <a:p>
+            <a:pPr algn="ctr"/>
+            <a:r>
+              <a:rPr lang="en-US" sz="2800" dirty="0">
+                <a:latin typeface="Helvetica" pitchFamily="2" charset="0"/>
+              </a:rPr>
+              <a:t>16</a:t>
+            </a:r>
+          </a:p>
+        </p:txBody>
+      </p:sp>
+      <p:sp>
+        <p:nvSpPr>
+          <p:cNvPr id="233" name="TextBox 232">
+            <a:extLst>
+              <a:ext uri="{FF2B5EF4-FFF2-40B4-BE49-F238E27FC236}">
+                <a16:creationId xmlns:a16="http://schemas.microsoft.com/office/drawing/2014/main" id="{B4354010-4E96-6749-91DE-AC585191030F}"/>
+              </a:ext>
+            </a:extLst>
+          </p:cNvPr>
+          <p:cNvSpPr txBox="1"/>
+          <p:nvPr/>
+        </p:nvSpPr>
+        <p:spPr>
+          <a:xfrm>
+            <a:off x="10305828" y="656684"/>
+            <a:ext cx="1989181" cy="523220"/>
+          </a:xfrm>
+          <a:prstGeom prst="rect">
+            <a:avLst/>
+          </a:prstGeom>
+          <a:noFill/>
+        </p:spPr>
+        <p:txBody>
+          <a:bodyPr wrap="square" rtlCol="0">
+            <a:spAutoFit/>
+          </a:bodyPr>
+          <a:lstStyle/>
+          <a:p>
+            <a:pPr algn="ctr"/>
+            <a:r>
+              <a:rPr lang="en-US" sz="2800" dirty="0">
+                <a:latin typeface="Helvetica" pitchFamily="2" charset="0"/>
+              </a:rPr>
+              <a:t>17</a:t>
+            </a:r>
+          </a:p>
+        </p:txBody>
+      </p:sp>
+      <p:sp>
+        <p:nvSpPr>
+          <p:cNvPr id="234" name="TextBox 233">
+            <a:extLst>
+              <a:ext uri="{FF2B5EF4-FFF2-40B4-BE49-F238E27FC236}">
+                <a16:creationId xmlns:a16="http://schemas.microsoft.com/office/drawing/2014/main" id="{437EE8AB-504D-3D4B-9450-6BFB3E7DC786}"/>
+              </a:ext>
+            </a:extLst>
+          </p:cNvPr>
+          <p:cNvSpPr txBox="1"/>
+          <p:nvPr/>
+        </p:nvSpPr>
+        <p:spPr>
+          <a:xfrm>
+            <a:off x="16719069" y="476338"/>
+            <a:ext cx="1989181" cy="523220"/>
+          </a:xfrm>
+          <a:prstGeom prst="rect">
+            <a:avLst/>
+          </a:prstGeom>
+          <a:noFill/>
+        </p:spPr>
+        <p:txBody>
+          <a:bodyPr wrap="square" rtlCol="0">
+            <a:spAutoFit/>
+          </a:bodyPr>
+          <a:lstStyle/>
+          <a:p>
+            <a:pPr algn="ctr"/>
+            <a:r>
+              <a:rPr lang="en-US" sz="2800" dirty="0">
+                <a:latin typeface="Helvetica" pitchFamily="2" charset="0"/>
+              </a:rPr>
+              <a:t>18</a:t>
+            </a:r>
+          </a:p>
+        </p:txBody>
+      </p:sp>
+      <p:sp>
+        <p:nvSpPr>
+          <p:cNvPr id="235" name="TextBox 234">
+            <a:extLst>
+              <a:ext uri="{FF2B5EF4-FFF2-40B4-BE49-F238E27FC236}">
+                <a16:creationId xmlns:a16="http://schemas.microsoft.com/office/drawing/2014/main" id="{86180DCB-75F6-7646-960A-0808A5B387AE}"/>
+              </a:ext>
+            </a:extLst>
+          </p:cNvPr>
+          <p:cNvSpPr txBox="1"/>
+          <p:nvPr/>
+        </p:nvSpPr>
+        <p:spPr>
+          <a:xfrm>
+            <a:off x="22338426" y="673045"/>
+            <a:ext cx="1989181" cy="523220"/>
+          </a:xfrm>
+          <a:prstGeom prst="rect">
+            <a:avLst/>
+          </a:prstGeom>
+          <a:noFill/>
+        </p:spPr>
+        <p:txBody>
+          <a:bodyPr wrap="square" rtlCol="0">
+            <a:spAutoFit/>
+          </a:bodyPr>
+          <a:lstStyle/>
+          <a:p>
+            <a:pPr algn="ctr"/>
+            <a:r>
+              <a:rPr lang="en-US" sz="2800" dirty="0">
+                <a:latin typeface="Helvetica" pitchFamily="2" charset="0"/>
+              </a:rPr>
+              <a:t>19</a:t>
+            </a:r>
+          </a:p>
+        </p:txBody>
+      </p:sp>
+      <p:sp>
+        <p:nvSpPr>
+          <p:cNvPr id="236" name="TextBox 235">
+            <a:extLst>
+              <a:ext uri="{FF2B5EF4-FFF2-40B4-BE49-F238E27FC236}">
+                <a16:creationId xmlns:a16="http://schemas.microsoft.com/office/drawing/2014/main" id="{6F941F5A-712E-014A-A79D-EE556F9F569E}"/>
+              </a:ext>
+            </a:extLst>
+          </p:cNvPr>
+          <p:cNvSpPr txBox="1"/>
+          <p:nvPr/>
+        </p:nvSpPr>
+        <p:spPr>
+          <a:xfrm>
+            <a:off x="21323542" y="4872130"/>
+            <a:ext cx="1989181" cy="523220"/>
+          </a:xfrm>
+          <a:prstGeom prst="rect">
+            <a:avLst/>
+          </a:prstGeom>
+          <a:noFill/>
+        </p:spPr>
+        <p:txBody>
+          <a:bodyPr wrap="square" rtlCol="0">
+            <a:spAutoFit/>
+          </a:bodyPr>
+          <a:lstStyle/>
+          <a:p>
+            <a:pPr algn="ctr"/>
+            <a:r>
+              <a:rPr lang="en-US" sz="2800" dirty="0">
+                <a:latin typeface="Helvetica" pitchFamily="2" charset="0"/>
+              </a:rPr>
+              <a:t>20</a:t>
+            </a:r>
+          </a:p>
+        </p:txBody>
+      </p:sp>
+      <p:sp>
+        <p:nvSpPr>
+          <p:cNvPr id="237" name="TextBox 236">
+            <a:extLst>
+              <a:ext uri="{FF2B5EF4-FFF2-40B4-BE49-F238E27FC236}">
+                <a16:creationId xmlns:a16="http://schemas.microsoft.com/office/drawing/2014/main" id="{4B00BB81-2FB9-4845-BC10-80A3A2DC8921}"/>
+              </a:ext>
+            </a:extLst>
+          </p:cNvPr>
+          <p:cNvSpPr txBox="1"/>
+          <p:nvPr/>
+        </p:nvSpPr>
+        <p:spPr>
+          <a:xfrm>
+            <a:off x="18764826" y="6873250"/>
+            <a:ext cx="1989181" cy="523220"/>
+          </a:xfrm>
+          <a:prstGeom prst="rect">
+            <a:avLst/>
+          </a:prstGeom>
+          <a:noFill/>
+        </p:spPr>
+        <p:txBody>
+          <a:bodyPr wrap="square" rtlCol="0">
+            <a:spAutoFit/>
+          </a:bodyPr>
+          <a:lstStyle/>
+          <a:p>
+            <a:pPr algn="ctr"/>
+            <a:r>
+              <a:rPr lang="en-US" sz="2800" dirty="0">
+                <a:latin typeface="Helvetica" pitchFamily="2" charset="0"/>
+              </a:rPr>
+              <a:t>22</a:t>
+            </a:r>
           </a:p>
         </p:txBody>
       </p:sp>

</xml_diff>

<commit_message>
added additional states to full model
</commit_message>
<xml_diff>
--- a/figures/full_model_diagram.pptx
+++ b/figures/full_model_diagram.pptx
@@ -243,7 +243,7 @@
           <a:p>
             <a:fld id="{5CB7705F-197A-364B-B966-A3D2D808BF85}" type="datetimeFigureOut">
               <a:rPr lang="en-US" smtClean="0"/>
-              <a:t>5/23/22</a:t>
+              <a:t>5/26/22</a:t>
             </a:fld>
             <a:endParaRPr lang="en-US"/>
           </a:p>
@@ -413,7 +413,7 @@
           <a:p>
             <a:fld id="{5CB7705F-197A-364B-B966-A3D2D808BF85}" type="datetimeFigureOut">
               <a:rPr lang="en-US" smtClean="0"/>
-              <a:t>5/23/22</a:t>
+              <a:t>5/26/22</a:t>
             </a:fld>
             <a:endParaRPr lang="en-US"/>
           </a:p>
@@ -593,7 +593,7 @@
           <a:p>
             <a:fld id="{5CB7705F-197A-364B-B966-A3D2D808BF85}" type="datetimeFigureOut">
               <a:rPr lang="en-US" smtClean="0"/>
-              <a:t>5/23/22</a:t>
+              <a:t>5/26/22</a:t>
             </a:fld>
             <a:endParaRPr lang="en-US"/>
           </a:p>
@@ -763,7 +763,7 @@
           <a:p>
             <a:fld id="{5CB7705F-197A-364B-B966-A3D2D808BF85}" type="datetimeFigureOut">
               <a:rPr lang="en-US" smtClean="0"/>
-              <a:t>5/23/22</a:t>
+              <a:t>5/26/22</a:t>
             </a:fld>
             <a:endParaRPr lang="en-US"/>
           </a:p>
@@ -1009,7 +1009,7 @@
           <a:p>
             <a:fld id="{5CB7705F-197A-364B-B966-A3D2D808BF85}" type="datetimeFigureOut">
               <a:rPr lang="en-US" smtClean="0"/>
-              <a:t>5/23/22</a:t>
+              <a:t>5/26/22</a:t>
             </a:fld>
             <a:endParaRPr lang="en-US"/>
           </a:p>
@@ -1241,7 +1241,7 @@
           <a:p>
             <a:fld id="{5CB7705F-197A-364B-B966-A3D2D808BF85}" type="datetimeFigureOut">
               <a:rPr lang="en-US" smtClean="0"/>
-              <a:t>5/23/22</a:t>
+              <a:t>5/26/22</a:t>
             </a:fld>
             <a:endParaRPr lang="en-US"/>
           </a:p>
@@ -1608,7 +1608,7 @@
           <a:p>
             <a:fld id="{5CB7705F-197A-364B-B966-A3D2D808BF85}" type="datetimeFigureOut">
               <a:rPr lang="en-US" smtClean="0"/>
-              <a:t>5/23/22</a:t>
+              <a:t>5/26/22</a:t>
             </a:fld>
             <a:endParaRPr lang="en-US"/>
           </a:p>
@@ -1726,7 +1726,7 @@
           <a:p>
             <a:fld id="{5CB7705F-197A-364B-B966-A3D2D808BF85}" type="datetimeFigureOut">
               <a:rPr lang="en-US" smtClean="0"/>
-              <a:t>5/23/22</a:t>
+              <a:t>5/26/22</a:t>
             </a:fld>
             <a:endParaRPr lang="en-US"/>
           </a:p>
@@ -1821,7 +1821,7 @@
           <a:p>
             <a:fld id="{5CB7705F-197A-364B-B966-A3D2D808BF85}" type="datetimeFigureOut">
               <a:rPr lang="en-US" smtClean="0"/>
-              <a:t>5/23/22</a:t>
+              <a:t>5/26/22</a:t>
             </a:fld>
             <a:endParaRPr lang="en-US"/>
           </a:p>
@@ -2098,7 +2098,7 @@
           <a:p>
             <a:fld id="{5CB7705F-197A-364B-B966-A3D2D808BF85}" type="datetimeFigureOut">
               <a:rPr lang="en-US" smtClean="0"/>
-              <a:t>5/23/22</a:t>
+              <a:t>5/26/22</a:t>
             </a:fld>
             <a:endParaRPr lang="en-US"/>
           </a:p>
@@ -2355,7 +2355,7 @@
           <a:p>
             <a:fld id="{5CB7705F-197A-364B-B966-A3D2D808BF85}" type="datetimeFigureOut">
               <a:rPr lang="en-US" smtClean="0"/>
-              <a:t>5/23/22</a:t>
+              <a:t>5/26/22</a:t>
             </a:fld>
             <a:endParaRPr lang="en-US"/>
           </a:p>
@@ -2568,7 +2568,7 @@
           <a:p>
             <a:fld id="{5CB7705F-197A-364B-B966-A3D2D808BF85}" type="datetimeFigureOut">
               <a:rPr lang="en-US" smtClean="0"/>
-              <a:t>5/23/22</a:t>
+              <a:t>5/26/22</a:t>
             </a:fld>
             <a:endParaRPr lang="en-US"/>
           </a:p>
@@ -4443,8 +4443,8 @@
         </p:nvCxnSpPr>
         <p:spPr>
           <a:xfrm>
-            <a:off x="3477150" y="4791496"/>
-            <a:ext cx="419141" cy="755300"/>
+            <a:off x="3630159" y="4867354"/>
+            <a:ext cx="266132" cy="679442"/>
           </a:xfrm>
           <a:prstGeom prst="straightConnector1">
             <a:avLst/>
@@ -5524,14 +5524,14 @@
           </p:cNvPr>
           <p:cNvCxnSpPr>
             <a:cxnSpLocks/>
-            <a:endCxn id="5" idx="1"/>
+            <a:endCxn id="4" idx="3"/>
           </p:cNvCxnSpPr>
           <p:nvPr/>
         </p:nvCxnSpPr>
         <p:spPr>
           <a:xfrm flipV="1">
-            <a:off x="2665461" y="6396292"/>
-            <a:ext cx="987707" cy="1591769"/>
+            <a:off x="2665461" y="7017328"/>
+            <a:ext cx="1002081" cy="970734"/>
           </a:xfrm>
           <a:prstGeom prst="straightConnector1">
             <a:avLst/>
@@ -8285,6 +8285,392 @@
                 <a:latin typeface="Helvetica" pitchFamily="2" charset="0"/>
               </a:rPr>
               <a:t>22</a:t>
+            </a:r>
+          </a:p>
+        </p:txBody>
+      </p:sp>
+      <p:sp>
+        <p:nvSpPr>
+          <p:cNvPr id="120" name="Oval 119">
+            <a:extLst>
+              <a:ext uri="{FF2B5EF4-FFF2-40B4-BE49-F238E27FC236}">
+                <a16:creationId xmlns:a16="http://schemas.microsoft.com/office/drawing/2014/main" id="{9FD8DC16-B3A7-8646-A171-F7598825C03D}"/>
+              </a:ext>
+            </a:extLst>
+          </p:cNvPr>
+          <p:cNvSpPr>
+            <a:spLocks noChangeAspect="1"/>
+          </p:cNvSpPr>
+          <p:nvPr/>
+        </p:nvSpPr>
+        <p:spPr>
+          <a:xfrm>
+            <a:off x="3739581" y="2375344"/>
+            <a:ext cx="1280160" cy="1280160"/>
+          </a:xfrm>
+          <a:prstGeom prst="ellipse">
+            <a:avLst/>
+          </a:prstGeom>
+          <a:noFill/>
+          <a:ln w="25400">
+            <a:solidFill>
+              <a:schemeClr val="accent6">
+                <a:lumMod val="75000"/>
+              </a:schemeClr>
+            </a:solidFill>
+          </a:ln>
+        </p:spPr>
+        <p:style>
+          <a:lnRef idx="2">
+            <a:schemeClr val="accent1">
+              <a:shade val="50000"/>
+            </a:schemeClr>
+          </a:lnRef>
+          <a:fillRef idx="1">
+            <a:schemeClr val="accent1"/>
+          </a:fillRef>
+          <a:effectRef idx="0">
+            <a:schemeClr val="accent1"/>
+          </a:effectRef>
+          <a:fontRef idx="minor">
+            <a:schemeClr val="lt1"/>
+          </a:fontRef>
+        </p:style>
+        <p:txBody>
+          <a:bodyPr rtlCol="0" anchor="ctr"/>
+          <a:lstStyle/>
+          <a:p>
+            <a:pPr algn="ctr"/>
+            <a:endParaRPr lang="en-US">
+              <a:solidFill>
+                <a:schemeClr val="accent6">
+                  <a:lumMod val="75000"/>
+                </a:schemeClr>
+              </a:solidFill>
+            </a:endParaRPr>
+          </a:p>
+        </p:txBody>
+      </p:sp>
+      <p:sp>
+        <p:nvSpPr>
+          <p:cNvPr id="121" name="TextBox 120">
+            <a:extLst>
+              <a:ext uri="{FF2B5EF4-FFF2-40B4-BE49-F238E27FC236}">
+                <a16:creationId xmlns:a16="http://schemas.microsoft.com/office/drawing/2014/main" id="{812BD21C-20C5-8947-97CB-8E1ACA7C1E7C}"/>
+              </a:ext>
+            </a:extLst>
+          </p:cNvPr>
+          <p:cNvSpPr txBox="1"/>
+          <p:nvPr/>
+        </p:nvSpPr>
+        <p:spPr>
+          <a:xfrm>
+            <a:off x="3700698" y="2731995"/>
+            <a:ext cx="1321904" cy="923330"/>
+          </a:xfrm>
+          <a:prstGeom prst="rect">
+            <a:avLst/>
+          </a:prstGeom>
+          <a:noFill/>
+        </p:spPr>
+        <p:txBody>
+          <a:bodyPr wrap="square" rtlCol="0">
+            <a:spAutoFit/>
+          </a:bodyPr>
+          <a:lstStyle/>
+          <a:p>
+            <a:pPr algn="ctr"/>
+            <a:r>
+              <a:rPr lang="en-US" dirty="0">
+                <a:latin typeface="Helvetica" pitchFamily="2" charset="0"/>
+              </a:rPr>
+              <a:t>BON to MCN other </a:t>
+            </a:r>
+            <a:r>
+              <a:rPr lang="en-US" dirty="0" err="1">
+                <a:latin typeface="Helvetica" pitchFamily="2" charset="0"/>
+              </a:rPr>
+              <a:t>trib</a:t>
+            </a:r>
+            <a:endParaRPr lang="en-US" dirty="0">
+              <a:latin typeface="Helvetica" pitchFamily="2" charset="0"/>
+            </a:endParaRPr>
+          </a:p>
+        </p:txBody>
+      </p:sp>
+      <p:cxnSp>
+        <p:nvCxnSpPr>
+          <p:cNvPr id="122" name="Straight Arrow Connector 121">
+            <a:extLst>
+              <a:ext uri="{FF2B5EF4-FFF2-40B4-BE49-F238E27FC236}">
+                <a16:creationId xmlns:a16="http://schemas.microsoft.com/office/drawing/2014/main" id="{E962F09F-CFCF-E44B-9BA2-90600CCFF81E}"/>
+              </a:ext>
+            </a:extLst>
+          </p:cNvPr>
+          <p:cNvCxnSpPr>
+            <a:cxnSpLocks/>
+            <a:endCxn id="4" idx="0"/>
+          </p:cNvCxnSpPr>
+          <p:nvPr/>
+        </p:nvCxnSpPr>
+        <p:spPr>
+          <a:xfrm flipH="1">
+            <a:off x="4314120" y="3687462"/>
+            <a:ext cx="41060" cy="1768888"/>
+          </a:xfrm>
+          <a:prstGeom prst="straightConnector1">
+            <a:avLst/>
+          </a:prstGeom>
+          <a:ln>
+            <a:solidFill>
+              <a:schemeClr val="tx1"/>
+            </a:solidFill>
+            <a:headEnd type="triangle"/>
+            <a:tailEnd type="triangle"/>
+          </a:ln>
+        </p:spPr>
+        <p:style>
+          <a:lnRef idx="1">
+            <a:schemeClr val="accent1"/>
+          </a:lnRef>
+          <a:fillRef idx="0">
+            <a:schemeClr val="accent1"/>
+          </a:fillRef>
+          <a:effectRef idx="0">
+            <a:schemeClr val="accent1"/>
+          </a:effectRef>
+          <a:fontRef idx="minor">
+            <a:schemeClr val="tx1"/>
+          </a:fontRef>
+        </p:style>
+      </p:cxnSp>
+      <p:sp>
+        <p:nvSpPr>
+          <p:cNvPr id="123" name="TextBox 122">
+            <a:extLst>
+              <a:ext uri="{FF2B5EF4-FFF2-40B4-BE49-F238E27FC236}">
+                <a16:creationId xmlns:a16="http://schemas.microsoft.com/office/drawing/2014/main" id="{9C4AC08A-84AD-E842-99AA-FADF2FCF7813}"/>
+              </a:ext>
+            </a:extLst>
+          </p:cNvPr>
+          <p:cNvSpPr txBox="1"/>
+          <p:nvPr/>
+        </p:nvSpPr>
+        <p:spPr>
+          <a:xfrm>
+            <a:off x="3373206" y="2350578"/>
+            <a:ext cx="1989181" cy="523220"/>
+          </a:xfrm>
+          <a:prstGeom prst="rect">
+            <a:avLst/>
+          </a:prstGeom>
+          <a:noFill/>
+        </p:spPr>
+        <p:txBody>
+          <a:bodyPr wrap="square" rtlCol="0">
+            <a:spAutoFit/>
+          </a:bodyPr>
+          <a:lstStyle/>
+          <a:p>
+            <a:pPr algn="ctr"/>
+            <a:r>
+              <a:rPr lang="en-US" sz="2800" dirty="0">
+                <a:latin typeface="Helvetica" pitchFamily="2" charset="0"/>
+              </a:rPr>
+              <a:t>27</a:t>
+            </a:r>
+          </a:p>
+        </p:txBody>
+      </p:sp>
+      <p:sp>
+        <p:nvSpPr>
+          <p:cNvPr id="126" name="Oval 125">
+            <a:extLst>
+              <a:ext uri="{FF2B5EF4-FFF2-40B4-BE49-F238E27FC236}">
+                <a16:creationId xmlns:a16="http://schemas.microsoft.com/office/drawing/2014/main" id="{F47C0BED-0241-0B44-8EE5-7E2C552ABE30}"/>
+              </a:ext>
+            </a:extLst>
+          </p:cNvPr>
+          <p:cNvSpPr>
+            <a:spLocks noChangeAspect="1"/>
+          </p:cNvSpPr>
+          <p:nvPr/>
+        </p:nvSpPr>
+        <p:spPr>
+          <a:xfrm>
+            <a:off x="18905359" y="4466118"/>
+            <a:ext cx="1280160" cy="1280160"/>
+          </a:xfrm>
+          <a:prstGeom prst="ellipse">
+            <a:avLst/>
+          </a:prstGeom>
+          <a:noFill/>
+          <a:ln w="25400">
+            <a:solidFill>
+              <a:schemeClr val="accent6">
+                <a:lumMod val="75000"/>
+              </a:schemeClr>
+            </a:solidFill>
+          </a:ln>
+        </p:spPr>
+        <p:style>
+          <a:lnRef idx="2">
+            <a:schemeClr val="accent1">
+              <a:shade val="50000"/>
+            </a:schemeClr>
+          </a:lnRef>
+          <a:fillRef idx="1">
+            <a:schemeClr val="accent1"/>
+          </a:fillRef>
+          <a:effectRef idx="0">
+            <a:schemeClr val="accent1"/>
+          </a:effectRef>
+          <a:fontRef idx="minor">
+            <a:schemeClr val="lt1"/>
+          </a:fontRef>
+        </p:style>
+        <p:txBody>
+          <a:bodyPr rtlCol="0" anchor="ctr"/>
+          <a:lstStyle/>
+          <a:p>
+            <a:pPr algn="ctr"/>
+            <a:endParaRPr lang="en-US">
+              <a:solidFill>
+                <a:schemeClr val="accent6">
+                  <a:lumMod val="75000"/>
+                </a:schemeClr>
+              </a:solidFill>
+            </a:endParaRPr>
+          </a:p>
+        </p:txBody>
+      </p:sp>
+      <p:sp>
+        <p:nvSpPr>
+          <p:cNvPr id="127" name="TextBox 126">
+            <a:extLst>
+              <a:ext uri="{FF2B5EF4-FFF2-40B4-BE49-F238E27FC236}">
+                <a16:creationId xmlns:a16="http://schemas.microsoft.com/office/drawing/2014/main" id="{20E7A524-8B56-FC46-8825-C052805C13A5}"/>
+              </a:ext>
+            </a:extLst>
+          </p:cNvPr>
+          <p:cNvSpPr txBox="1"/>
+          <p:nvPr/>
+        </p:nvSpPr>
+        <p:spPr>
+          <a:xfrm>
+            <a:off x="18866476" y="4822769"/>
+            <a:ext cx="1321904" cy="923330"/>
+          </a:xfrm>
+          <a:prstGeom prst="rect">
+            <a:avLst/>
+          </a:prstGeom>
+          <a:noFill/>
+        </p:spPr>
+        <p:txBody>
+          <a:bodyPr wrap="square" rtlCol="0">
+            <a:spAutoFit/>
+          </a:bodyPr>
+          <a:lstStyle/>
+          <a:p>
+            <a:pPr algn="ctr"/>
+            <a:r>
+              <a:rPr lang="en-US" dirty="0">
+                <a:latin typeface="Helvetica" pitchFamily="2" charset="0"/>
+              </a:rPr>
+              <a:t>Upstream WEL other </a:t>
+            </a:r>
+            <a:r>
+              <a:rPr lang="en-US" dirty="0" err="1">
+                <a:latin typeface="Helvetica" pitchFamily="2" charset="0"/>
+              </a:rPr>
+              <a:t>trib</a:t>
+            </a:r>
+            <a:endParaRPr lang="en-US" dirty="0">
+              <a:latin typeface="Helvetica" pitchFamily="2" charset="0"/>
+            </a:endParaRPr>
+          </a:p>
+        </p:txBody>
+      </p:sp>
+      <p:cxnSp>
+        <p:nvCxnSpPr>
+          <p:cNvPr id="129" name="Straight Arrow Connector 128">
+            <a:extLst>
+              <a:ext uri="{FF2B5EF4-FFF2-40B4-BE49-F238E27FC236}">
+                <a16:creationId xmlns:a16="http://schemas.microsoft.com/office/drawing/2014/main" id="{0B6E0BD1-3B6A-344D-9CD8-8E3394AA3EC0}"/>
+              </a:ext>
+            </a:extLst>
+          </p:cNvPr>
+          <p:cNvCxnSpPr>
+            <a:cxnSpLocks/>
+            <a:endCxn id="131" idx="3"/>
+          </p:cNvCxnSpPr>
+          <p:nvPr/>
+        </p:nvCxnSpPr>
+        <p:spPr>
+          <a:xfrm flipV="1">
+            <a:off x="19968872" y="3735324"/>
+            <a:ext cx="1407491" cy="952974"/>
+          </a:xfrm>
+          <a:prstGeom prst="straightConnector1">
+            <a:avLst/>
+          </a:prstGeom>
+          <a:ln>
+            <a:solidFill>
+              <a:schemeClr val="tx1"/>
+            </a:solidFill>
+            <a:headEnd type="triangle"/>
+            <a:tailEnd type="triangle"/>
+          </a:ln>
+        </p:spPr>
+        <p:style>
+          <a:lnRef idx="1">
+            <a:schemeClr val="accent1"/>
+          </a:lnRef>
+          <a:fillRef idx="0">
+            <a:schemeClr val="accent1"/>
+          </a:fillRef>
+          <a:effectRef idx="0">
+            <a:schemeClr val="accent1"/>
+          </a:effectRef>
+          <a:fontRef idx="minor">
+            <a:schemeClr val="tx1"/>
+          </a:fontRef>
+        </p:style>
+      </p:cxnSp>
+      <p:sp>
+        <p:nvSpPr>
+          <p:cNvPr id="133" name="TextBox 132">
+            <a:extLst>
+              <a:ext uri="{FF2B5EF4-FFF2-40B4-BE49-F238E27FC236}">
+                <a16:creationId xmlns:a16="http://schemas.microsoft.com/office/drawing/2014/main" id="{25DE50DB-C30B-F240-82B0-7B348FB344B0}"/>
+              </a:ext>
+            </a:extLst>
+          </p:cNvPr>
+          <p:cNvSpPr txBox="1"/>
+          <p:nvPr/>
+        </p:nvSpPr>
+        <p:spPr>
+          <a:xfrm>
+            <a:off x="18506590" y="4447381"/>
+            <a:ext cx="1989181" cy="523220"/>
+          </a:xfrm>
+          <a:prstGeom prst="rect">
+            <a:avLst/>
+          </a:prstGeom>
+          <a:noFill/>
+        </p:spPr>
+        <p:txBody>
+          <a:bodyPr wrap="square" rtlCol="0">
+            <a:spAutoFit/>
+          </a:bodyPr>
+          <a:lstStyle/>
+          <a:p>
+            <a:pPr algn="ctr"/>
+            <a:r>
+              <a:rPr lang="en-US" sz="2800" dirty="0">
+                <a:latin typeface="Helvetica" pitchFamily="2" charset="0"/>
+              </a:rPr>
+              <a:t>28</a:t>
             </a:r>
           </a:p>
         </p:txBody>

</xml_diff>

<commit_message>
added missing LGR dam to schematic
</commit_message>
<xml_diff>
--- a/figures/full_model_diagram.pptx
+++ b/figures/full_model_diagram.pptx
@@ -243,7 +243,7 @@
           <a:p>
             <a:fld id="{5CB7705F-197A-364B-B966-A3D2D808BF85}" type="datetimeFigureOut">
               <a:rPr lang="en-US" smtClean="0"/>
-              <a:t>5/26/22</a:t>
+              <a:t>6/6/22</a:t>
             </a:fld>
             <a:endParaRPr lang="en-US"/>
           </a:p>
@@ -413,7 +413,7 @@
           <a:p>
             <a:fld id="{5CB7705F-197A-364B-B966-A3D2D808BF85}" type="datetimeFigureOut">
               <a:rPr lang="en-US" smtClean="0"/>
-              <a:t>5/26/22</a:t>
+              <a:t>6/6/22</a:t>
             </a:fld>
             <a:endParaRPr lang="en-US"/>
           </a:p>
@@ -593,7 +593,7 @@
           <a:p>
             <a:fld id="{5CB7705F-197A-364B-B966-A3D2D808BF85}" type="datetimeFigureOut">
               <a:rPr lang="en-US" smtClean="0"/>
-              <a:t>5/26/22</a:t>
+              <a:t>6/6/22</a:t>
             </a:fld>
             <a:endParaRPr lang="en-US"/>
           </a:p>
@@ -763,7 +763,7 @@
           <a:p>
             <a:fld id="{5CB7705F-197A-364B-B966-A3D2D808BF85}" type="datetimeFigureOut">
               <a:rPr lang="en-US" smtClean="0"/>
-              <a:t>5/26/22</a:t>
+              <a:t>6/6/22</a:t>
             </a:fld>
             <a:endParaRPr lang="en-US"/>
           </a:p>
@@ -1009,7 +1009,7 @@
           <a:p>
             <a:fld id="{5CB7705F-197A-364B-B966-A3D2D808BF85}" type="datetimeFigureOut">
               <a:rPr lang="en-US" smtClean="0"/>
-              <a:t>5/26/22</a:t>
+              <a:t>6/6/22</a:t>
             </a:fld>
             <a:endParaRPr lang="en-US"/>
           </a:p>
@@ -1241,7 +1241,7 @@
           <a:p>
             <a:fld id="{5CB7705F-197A-364B-B966-A3D2D808BF85}" type="datetimeFigureOut">
               <a:rPr lang="en-US" smtClean="0"/>
-              <a:t>5/26/22</a:t>
+              <a:t>6/6/22</a:t>
             </a:fld>
             <a:endParaRPr lang="en-US"/>
           </a:p>
@@ -1608,7 +1608,7 @@
           <a:p>
             <a:fld id="{5CB7705F-197A-364B-B966-A3D2D808BF85}" type="datetimeFigureOut">
               <a:rPr lang="en-US" smtClean="0"/>
-              <a:t>5/26/22</a:t>
+              <a:t>6/6/22</a:t>
             </a:fld>
             <a:endParaRPr lang="en-US"/>
           </a:p>
@@ -1726,7 +1726,7 @@
           <a:p>
             <a:fld id="{5CB7705F-197A-364B-B966-A3D2D808BF85}" type="datetimeFigureOut">
               <a:rPr lang="en-US" smtClean="0"/>
-              <a:t>5/26/22</a:t>
+              <a:t>6/6/22</a:t>
             </a:fld>
             <a:endParaRPr lang="en-US"/>
           </a:p>
@@ -1821,7 +1821,7 @@
           <a:p>
             <a:fld id="{5CB7705F-197A-364B-B966-A3D2D808BF85}" type="datetimeFigureOut">
               <a:rPr lang="en-US" smtClean="0"/>
-              <a:t>5/26/22</a:t>
+              <a:t>6/6/22</a:t>
             </a:fld>
             <a:endParaRPr lang="en-US"/>
           </a:p>
@@ -2098,7 +2098,7 @@
           <a:p>
             <a:fld id="{5CB7705F-197A-364B-B966-A3D2D808BF85}" type="datetimeFigureOut">
               <a:rPr lang="en-US" smtClean="0"/>
-              <a:t>5/26/22</a:t>
+              <a:t>6/6/22</a:t>
             </a:fld>
             <a:endParaRPr lang="en-US"/>
           </a:p>
@@ -2355,7 +2355,7 @@
           <a:p>
             <a:fld id="{5CB7705F-197A-364B-B966-A3D2D808BF85}" type="datetimeFigureOut">
               <a:rPr lang="en-US" smtClean="0"/>
-              <a:t>5/26/22</a:t>
+              <a:t>6/6/22</a:t>
             </a:fld>
             <a:endParaRPr lang="en-US"/>
           </a:p>
@@ -2568,7 +2568,7 @@
           <a:p>
             <a:fld id="{5CB7705F-197A-364B-B966-A3D2D808BF85}" type="datetimeFigureOut">
               <a:rPr lang="en-US" smtClean="0"/>
-              <a:t>5/26/22</a:t>
+              <a:t>6/6/22</a:t>
             </a:fld>
             <a:endParaRPr lang="en-US"/>
           </a:p>
@@ -5715,13 +5715,14 @@
           <p:cNvCxnSpPr>
             <a:cxnSpLocks/>
             <a:stCxn id="151" idx="0"/>
+            <a:endCxn id="4" idx="4"/>
           </p:cNvCxnSpPr>
           <p:nvPr/>
         </p:nvCxnSpPr>
         <p:spPr>
           <a:xfrm flipV="1">
-            <a:off x="4258375" y="7385386"/>
-            <a:ext cx="33726" cy="1435344"/>
+            <a:off x="4258375" y="7285150"/>
+            <a:ext cx="55745" cy="1535580"/>
           </a:xfrm>
           <a:prstGeom prst="straightConnector1">
             <a:avLst/>
@@ -8671,6 +8672,87 @@
                 <a:latin typeface="Helvetica" pitchFamily="2" charset="0"/>
               </a:rPr>
               <a:t>28</a:t>
+            </a:r>
+          </a:p>
+        </p:txBody>
+      </p:sp>
+      <p:cxnSp>
+        <p:nvCxnSpPr>
+          <p:cNvPr id="135" name="Straight Connector 134">
+            <a:extLst>
+              <a:ext uri="{FF2B5EF4-FFF2-40B4-BE49-F238E27FC236}">
+                <a16:creationId xmlns:a16="http://schemas.microsoft.com/office/drawing/2014/main" id="{E45EAF14-E6A6-D348-B194-713C74599251}"/>
+              </a:ext>
+            </a:extLst>
+          </p:cNvPr>
+          <p:cNvCxnSpPr>
+            <a:cxnSpLocks/>
+          </p:cNvCxnSpPr>
+          <p:nvPr/>
+        </p:nvCxnSpPr>
+        <p:spPr>
+          <a:xfrm flipH="1">
+            <a:off x="16585935" y="9645267"/>
+            <a:ext cx="1" cy="644039"/>
+          </a:xfrm>
+          <a:prstGeom prst="line">
+            <a:avLst/>
+          </a:prstGeom>
+          <a:ln w="88900">
+            <a:solidFill>
+              <a:schemeClr val="tx1"/>
+            </a:solidFill>
+          </a:ln>
+        </p:spPr>
+        <p:style>
+          <a:lnRef idx="1">
+            <a:schemeClr val="accent1"/>
+          </a:lnRef>
+          <a:fillRef idx="0">
+            <a:schemeClr val="accent1"/>
+          </a:fillRef>
+          <a:effectRef idx="0">
+            <a:schemeClr val="accent1"/>
+          </a:effectRef>
+          <a:fontRef idx="minor">
+            <a:schemeClr val="tx1"/>
+          </a:fontRef>
+        </p:style>
+      </p:cxnSp>
+      <p:sp>
+        <p:nvSpPr>
+          <p:cNvPr id="136" name="TextBox 135">
+            <a:extLst>
+              <a:ext uri="{FF2B5EF4-FFF2-40B4-BE49-F238E27FC236}">
+                <a16:creationId xmlns:a16="http://schemas.microsoft.com/office/drawing/2014/main" id="{2EFB59FB-14E8-AF4C-B7D8-520953AF3D9D}"/>
+              </a:ext>
+            </a:extLst>
+          </p:cNvPr>
+          <p:cNvSpPr txBox="1"/>
+          <p:nvPr/>
+        </p:nvSpPr>
+        <p:spPr>
+          <a:xfrm>
+            <a:off x="15581617" y="9160159"/>
+            <a:ext cx="1989181" cy="523220"/>
+          </a:xfrm>
+          <a:prstGeom prst="rect">
+            <a:avLst/>
+          </a:prstGeom>
+          <a:noFill/>
+        </p:spPr>
+        <p:txBody>
+          <a:bodyPr wrap="square" rtlCol="0">
+            <a:spAutoFit/>
+          </a:bodyPr>
+          <a:lstStyle/>
+          <a:p>
+            <a:pPr algn="ctr"/>
+            <a:r>
+              <a:rPr lang="en-US" sz="2800" dirty="0">
+                <a:latin typeface="Helvetica" pitchFamily="2" charset="0"/>
+              </a:rPr>
+              <a:t>LGR</a:t>
             </a:r>
           </a:p>
         </p:txBody>

</xml_diff>